<commit_message>
Figure as svg. Typo, resource name, font fixed.
</commit_message>
<xml_diff>
--- a/input/images-source/CoursePhasePlans_Figures.pptx
+++ b/input/images-source/CoursePhasePlans_Figures.pptx
@@ -5,9 +5,12 @@
     <p:sldMasterId id="2147483648" r:id="rId1"/>
   </p:sldMasterIdLst>
   <p:sldIdLst>
-    <p:sldId id="261" r:id="rId2"/>
-    <p:sldId id="280" r:id="rId3"/>
-    <p:sldId id="260" r:id="rId4"/>
+    <p:sldId id="282" r:id="rId2"/>
+    <p:sldId id="281" r:id="rId3"/>
+    <p:sldId id="283" r:id="rId4"/>
+    <p:sldId id="260" r:id="rId5"/>
+    <p:sldId id="280" r:id="rId6"/>
+    <p:sldId id="261" r:id="rId7"/>
   </p:sldIdLst>
   <p:sldSz cx="12192000" cy="6858000"/>
   <p:notesSz cx="6858000" cy="9144000"/>
@@ -261,7 +264,7 @@
           <a:p>
             <a:fld id="{56F5EB7C-0D9D-4AA3-9C88-196B1A053949}" type="datetimeFigureOut">
               <a:rPr lang="en-US" smtClean="0"/>
-              <a:t>5/24/2022</a:t>
+              <a:t>10/3/2022</a:t>
             </a:fld>
             <a:endParaRPr lang="en-US"/>
           </a:p>
@@ -459,7 +462,7 @@
           <a:p>
             <a:fld id="{56F5EB7C-0D9D-4AA3-9C88-196B1A053949}" type="datetimeFigureOut">
               <a:rPr lang="en-US" smtClean="0"/>
-              <a:t>5/24/2022</a:t>
+              <a:t>10/3/2022</a:t>
             </a:fld>
             <a:endParaRPr lang="en-US"/>
           </a:p>
@@ -667,7 +670,7 @@
           <a:p>
             <a:fld id="{56F5EB7C-0D9D-4AA3-9C88-196B1A053949}" type="datetimeFigureOut">
               <a:rPr lang="en-US" smtClean="0"/>
-              <a:t>5/24/2022</a:t>
+              <a:t>10/3/2022</a:t>
             </a:fld>
             <a:endParaRPr lang="en-US"/>
           </a:p>
@@ -865,7 +868,7 @@
           <a:p>
             <a:fld id="{56F5EB7C-0D9D-4AA3-9C88-196B1A053949}" type="datetimeFigureOut">
               <a:rPr lang="en-US" smtClean="0"/>
-              <a:t>5/24/2022</a:t>
+              <a:t>10/3/2022</a:t>
             </a:fld>
             <a:endParaRPr lang="en-US"/>
           </a:p>
@@ -1140,7 +1143,7 @@
           <a:p>
             <a:fld id="{56F5EB7C-0D9D-4AA3-9C88-196B1A053949}" type="datetimeFigureOut">
               <a:rPr lang="en-US" smtClean="0"/>
-              <a:t>5/24/2022</a:t>
+              <a:t>10/3/2022</a:t>
             </a:fld>
             <a:endParaRPr lang="en-US"/>
           </a:p>
@@ -1405,7 +1408,7 @@
           <a:p>
             <a:fld id="{56F5EB7C-0D9D-4AA3-9C88-196B1A053949}" type="datetimeFigureOut">
               <a:rPr lang="en-US" smtClean="0"/>
-              <a:t>5/24/2022</a:t>
+              <a:t>10/3/2022</a:t>
             </a:fld>
             <a:endParaRPr lang="en-US"/>
           </a:p>
@@ -1817,7 +1820,7 @@
           <a:p>
             <a:fld id="{56F5EB7C-0D9D-4AA3-9C88-196B1A053949}" type="datetimeFigureOut">
               <a:rPr lang="en-US" smtClean="0"/>
-              <a:t>5/24/2022</a:t>
+              <a:t>10/3/2022</a:t>
             </a:fld>
             <a:endParaRPr lang="en-US"/>
           </a:p>
@@ -1958,7 +1961,7 @@
           <a:p>
             <a:fld id="{56F5EB7C-0D9D-4AA3-9C88-196B1A053949}" type="datetimeFigureOut">
               <a:rPr lang="en-US" smtClean="0"/>
-              <a:t>5/24/2022</a:t>
+              <a:t>10/3/2022</a:t>
             </a:fld>
             <a:endParaRPr lang="en-US"/>
           </a:p>
@@ -2071,7 +2074,7 @@
           <a:p>
             <a:fld id="{56F5EB7C-0D9D-4AA3-9C88-196B1A053949}" type="datetimeFigureOut">
               <a:rPr lang="en-US" smtClean="0"/>
-              <a:t>5/24/2022</a:t>
+              <a:t>10/3/2022</a:t>
             </a:fld>
             <a:endParaRPr lang="en-US"/>
           </a:p>
@@ -2382,7 +2385,7 @@
           <a:p>
             <a:fld id="{56F5EB7C-0D9D-4AA3-9C88-196B1A053949}" type="datetimeFigureOut">
               <a:rPr lang="en-US" smtClean="0"/>
-              <a:t>5/24/2022</a:t>
+              <a:t>10/3/2022</a:t>
             </a:fld>
             <a:endParaRPr lang="en-US"/>
           </a:p>
@@ -2670,7 +2673,7 @@
           <a:p>
             <a:fld id="{56F5EB7C-0D9D-4AA3-9C88-196B1A053949}" type="datetimeFigureOut">
               <a:rPr lang="en-US" smtClean="0"/>
-              <a:t>5/24/2022</a:t>
+              <a:t>10/3/2022</a:t>
             </a:fld>
             <a:endParaRPr lang="en-US"/>
           </a:p>
@@ -2911,7 +2914,7 @@
           <a:p>
             <a:fld id="{56F5EB7C-0D9D-4AA3-9C88-196B1A053949}" type="datetimeFigureOut">
               <a:rPr lang="en-US" smtClean="0"/>
-              <a:t>5/24/2022</a:t>
+              <a:t>10/3/2022</a:t>
             </a:fld>
             <a:endParaRPr lang="en-US"/>
           </a:p>
@@ -3328,924 +3331,12 @@
           <a:chExt cx="0" cy="0"/>
         </a:xfrm>
       </p:grpSpPr>
-      <p:cxnSp>
-        <p:nvCxnSpPr>
-          <p:cNvPr id="5" name="Straight Connector 4"/>
-          <p:cNvCxnSpPr/>
-          <p:nvPr/>
-        </p:nvCxnSpPr>
-        <p:spPr>
-          <a:xfrm flipV="1">
-            <a:off x="1058379" y="1624197"/>
-            <a:ext cx="10723801" cy="30865"/>
-          </a:xfrm>
-          <a:prstGeom prst="line">
-            <a:avLst/>
-          </a:prstGeom>
-          <a:ln w="38100"/>
-        </p:spPr>
-        <p:style>
-          <a:lnRef idx="1">
-            <a:schemeClr val="accent1"/>
-          </a:lnRef>
-          <a:fillRef idx="0">
-            <a:schemeClr val="accent1"/>
-          </a:fillRef>
-          <a:effectRef idx="0">
-            <a:schemeClr val="accent1"/>
-          </a:effectRef>
-          <a:fontRef idx="minor">
-            <a:schemeClr val="tx1"/>
-          </a:fontRef>
-        </p:style>
-      </p:cxnSp>
-      <p:cxnSp>
-        <p:nvCxnSpPr>
-          <p:cNvPr id="6" name="Straight Connector 5"/>
-          <p:cNvCxnSpPr/>
-          <p:nvPr/>
-        </p:nvCxnSpPr>
-        <p:spPr>
-          <a:xfrm flipV="1">
-            <a:off x="1061353" y="3823784"/>
-            <a:ext cx="10723801" cy="12490"/>
-          </a:xfrm>
-          <a:prstGeom prst="line">
-            <a:avLst/>
-          </a:prstGeom>
-          <a:ln w="38100"/>
-        </p:spPr>
-        <p:style>
-          <a:lnRef idx="1">
-            <a:schemeClr val="accent1"/>
-          </a:lnRef>
-          <a:fillRef idx="0">
-            <a:schemeClr val="accent1"/>
-          </a:fillRef>
-          <a:effectRef idx="0">
-            <a:schemeClr val="accent1"/>
-          </a:effectRef>
-          <a:fontRef idx="minor">
-            <a:schemeClr val="tx1"/>
-          </a:fontRef>
-        </p:style>
-      </p:cxnSp>
-      <p:sp>
-        <p:nvSpPr>
-          <p:cNvPr id="7" name="TextBox 6"/>
-          <p:cNvSpPr txBox="1"/>
-          <p:nvPr/>
-        </p:nvSpPr>
-        <p:spPr>
-          <a:xfrm>
-            <a:off x="65990" y="4087209"/>
-            <a:ext cx="1990726" cy="646331"/>
-          </a:xfrm>
-          <a:prstGeom prst="rect">
-            <a:avLst/>
-          </a:prstGeom>
-          <a:noFill/>
-        </p:spPr>
-        <p:txBody>
-          <a:bodyPr wrap="square" rtlCol="0">
-            <a:spAutoFit/>
-          </a:bodyPr>
-          <a:lstStyle/>
-          <a:p>
-            <a:r>
-              <a:rPr lang="en-US" dirty="0"/>
-              <a:t>Delivered Treatment Plan</a:t>
-            </a:r>
-          </a:p>
-        </p:txBody>
-      </p:sp>
-      <p:sp>
-        <p:nvSpPr>
-          <p:cNvPr id="8" name="TextBox 7"/>
-          <p:cNvSpPr txBox="1"/>
-          <p:nvPr/>
-        </p:nvSpPr>
-        <p:spPr>
-          <a:xfrm>
-            <a:off x="0" y="1803796"/>
-            <a:ext cx="2276475" cy="369332"/>
-          </a:xfrm>
-          <a:prstGeom prst="rect">
-            <a:avLst/>
-          </a:prstGeom>
-          <a:noFill/>
-        </p:spPr>
-        <p:txBody>
-          <a:bodyPr wrap="square" rtlCol="0">
-            <a:spAutoFit/>
-          </a:bodyPr>
-          <a:lstStyle/>
-          <a:p>
-            <a:r>
-              <a:rPr lang="en-US" dirty="0"/>
-              <a:t>Phase Summary</a:t>
-            </a:r>
-          </a:p>
-        </p:txBody>
-      </p:sp>
-      <p:sp>
-        <p:nvSpPr>
-          <p:cNvPr id="9" name="TextBox 8"/>
-          <p:cNvSpPr txBox="1"/>
-          <p:nvPr/>
-        </p:nvSpPr>
-        <p:spPr>
-          <a:xfrm>
-            <a:off x="0" y="68413"/>
-            <a:ext cx="1778436" cy="369332"/>
-          </a:xfrm>
-          <a:prstGeom prst="rect">
-            <a:avLst/>
-          </a:prstGeom>
-          <a:noFill/>
-        </p:spPr>
-        <p:txBody>
-          <a:bodyPr wrap="none" rtlCol="0">
-            <a:spAutoFit/>
-          </a:bodyPr>
-          <a:lstStyle/>
-          <a:p>
-            <a:r>
-              <a:rPr lang="en-US" dirty="0"/>
-              <a:t>Course Summary</a:t>
-            </a:r>
-          </a:p>
-        </p:txBody>
-      </p:sp>
-      <p:sp>
-        <p:nvSpPr>
-          <p:cNvPr id="18" name="Rectangle 17"/>
-          <p:cNvSpPr/>
-          <p:nvPr/>
-        </p:nvSpPr>
-        <p:spPr>
-          <a:xfrm>
-            <a:off x="5597940" y="4128242"/>
-            <a:ext cx="2525494" cy="614601"/>
-          </a:xfrm>
-          <a:prstGeom prst="rect">
-            <a:avLst/>
-          </a:prstGeom>
-          <a:solidFill>
-            <a:schemeClr val="accent6">
-              <a:lumMod val="75000"/>
-            </a:schemeClr>
-          </a:solidFill>
-        </p:spPr>
-        <p:style>
-          <a:lnRef idx="2">
-            <a:schemeClr val="accent1">
-              <a:shade val="50000"/>
-            </a:schemeClr>
-          </a:lnRef>
-          <a:fillRef idx="1">
-            <a:schemeClr val="accent1"/>
-          </a:fillRef>
-          <a:effectRef idx="0">
-            <a:schemeClr val="accent1"/>
-          </a:effectRef>
-          <a:fontRef idx="minor">
-            <a:schemeClr val="lt1"/>
-          </a:fontRef>
-        </p:style>
-        <p:txBody>
-          <a:bodyPr rtlCol="0" anchor="ctr"/>
-          <a:lstStyle/>
-          <a:p>
-            <a:pPr algn="ctr"/>
-            <a:r>
-              <a:rPr lang="en-US" sz="1600" dirty="0"/>
-              <a:t>Prostate + SV</a:t>
-            </a:r>
-          </a:p>
-          <a:p>
-            <a:pPr algn="ctr"/>
-            <a:r>
-              <a:rPr lang="en-US" sz="1100" dirty="0"/>
-              <a:t>(5 fractions delivered out of 5 planned)</a:t>
-            </a:r>
-          </a:p>
-        </p:txBody>
-      </p:sp>
-      <p:sp>
-        <p:nvSpPr>
-          <p:cNvPr id="19" name="Rectangle 18"/>
-          <p:cNvSpPr/>
-          <p:nvPr/>
-        </p:nvSpPr>
-        <p:spPr>
-          <a:xfrm>
-            <a:off x="8887009" y="4128241"/>
-            <a:ext cx="2220694" cy="648001"/>
-          </a:xfrm>
-          <a:prstGeom prst="rect">
-            <a:avLst/>
-          </a:prstGeom>
-          <a:solidFill>
-            <a:srgbClr val="00B0F0"/>
-          </a:solidFill>
-        </p:spPr>
-        <p:style>
-          <a:lnRef idx="2">
-            <a:schemeClr val="accent1">
-              <a:shade val="50000"/>
-            </a:schemeClr>
-          </a:lnRef>
-          <a:fillRef idx="1">
-            <a:schemeClr val="accent1"/>
-          </a:fillRef>
-          <a:effectRef idx="0">
-            <a:schemeClr val="accent1"/>
-          </a:effectRef>
-          <a:fontRef idx="minor">
-            <a:schemeClr val="lt1"/>
-          </a:fontRef>
-        </p:style>
-        <p:txBody>
-          <a:bodyPr rtlCol="0" anchor="t" anchorCtr="0"/>
-          <a:lstStyle/>
-          <a:p>
-            <a:pPr algn="ctr"/>
-            <a:r>
-              <a:rPr lang="en-US" sz="1600" i="1" dirty="0"/>
-              <a:t>Prostate</a:t>
-            </a:r>
-          </a:p>
-          <a:p>
-            <a:pPr algn="ctr"/>
-            <a:r>
-              <a:rPr lang="en-US" sz="1100" i="1" dirty="0"/>
-              <a:t>(5 fractions delivered  of 5 planned)</a:t>
-            </a:r>
-          </a:p>
-        </p:txBody>
-      </p:sp>
-      <p:sp>
-        <p:nvSpPr>
-          <p:cNvPr id="56" name="Rectangle 55"/>
-          <p:cNvSpPr/>
-          <p:nvPr/>
-        </p:nvSpPr>
-        <p:spPr>
-          <a:xfrm>
-            <a:off x="2896239" y="1762177"/>
-            <a:ext cx="2908501" cy="1763963"/>
-          </a:xfrm>
-          <a:prstGeom prst="rect">
-            <a:avLst/>
-          </a:prstGeom>
-          <a:solidFill>
-            <a:srgbClr val="002060"/>
-          </a:solidFill>
-        </p:spPr>
-        <p:style>
-          <a:lnRef idx="2">
-            <a:schemeClr val="accent1">
-              <a:shade val="50000"/>
-            </a:schemeClr>
-          </a:lnRef>
-          <a:fillRef idx="1">
-            <a:schemeClr val="accent1"/>
-          </a:fillRef>
-          <a:effectRef idx="0">
-            <a:schemeClr val="accent1"/>
-          </a:effectRef>
-          <a:fontRef idx="minor">
-            <a:schemeClr val="lt1"/>
-          </a:fontRef>
-        </p:style>
-        <p:txBody>
-          <a:bodyPr rtlCol="0" anchor="ctr"/>
-          <a:lstStyle/>
-          <a:p>
-            <a:r>
-              <a:rPr lang="en-US" sz="1600" dirty="0"/>
-              <a:t>Phase Name: 1</a:t>
-            </a:r>
-            <a:r>
-              <a:rPr lang="en-US" sz="1600" baseline="30000" dirty="0"/>
-              <a:t>st</a:t>
-            </a:r>
-            <a:r>
-              <a:rPr lang="en-US" sz="1600" dirty="0"/>
-              <a:t> course</a:t>
-            </a:r>
-          </a:p>
-          <a:p>
-            <a:r>
-              <a:rPr lang="en-US" sz="1400" dirty="0"/>
-              <a:t>Target Volumes</a:t>
-            </a:r>
-          </a:p>
-          <a:p>
-            <a:pPr marL="461963" lvl="1" indent="-4763">
-              <a:buFont typeface="Arial" panose="020B0604020202020204" pitchFamily="34" charset="0"/>
-              <a:buChar char="•"/>
-            </a:pPr>
-            <a:r>
-              <a:rPr lang="en-US" sz="1400" dirty="0"/>
-              <a:t>    Prostate: 5000cGy</a:t>
-            </a:r>
-          </a:p>
-          <a:p>
-            <a:pPr marL="461963" lvl="1" indent="-4763">
-              <a:buFont typeface="Arial" panose="020B0604020202020204" pitchFamily="34" charset="0"/>
-              <a:buChar char="•"/>
-            </a:pPr>
-            <a:r>
-              <a:rPr lang="en-US" sz="1400" dirty="0"/>
-              <a:t>    SV: 5000 </a:t>
-            </a:r>
-            <a:r>
-              <a:rPr lang="en-US" sz="1400" dirty="0" err="1"/>
-              <a:t>cGy</a:t>
-            </a:r>
-            <a:endParaRPr lang="en-US" sz="1400" dirty="0"/>
-          </a:p>
-          <a:p>
-            <a:pPr marL="461963" lvl="1" indent="-4763">
-              <a:buFont typeface="Arial" panose="020B0604020202020204" pitchFamily="34" charset="0"/>
-              <a:buChar char="•"/>
-            </a:pPr>
-            <a:r>
-              <a:rPr lang="en-US" sz="1400" dirty="0"/>
-              <a:t>    Pelvic Nodes: 4500 </a:t>
-            </a:r>
-            <a:r>
-              <a:rPr lang="en-US" sz="1400" dirty="0" err="1"/>
-              <a:t>cGy</a:t>
-            </a:r>
-            <a:endParaRPr lang="en-US" sz="1400" dirty="0"/>
-          </a:p>
-          <a:p>
-            <a:r>
-              <a:rPr lang="en-US" sz="1400" dirty="0"/>
-              <a:t>Treated in 25 phase fractions </a:t>
-            </a:r>
-          </a:p>
-          <a:p>
-            <a:r>
-              <a:rPr lang="en-US" sz="1400" dirty="0"/>
-              <a:t>using Photons VMAT</a:t>
-            </a:r>
-          </a:p>
-        </p:txBody>
-      </p:sp>
-      <p:cxnSp>
-        <p:nvCxnSpPr>
-          <p:cNvPr id="58" name="Straight Arrow Connector 57"/>
-          <p:cNvCxnSpPr/>
-          <p:nvPr/>
-        </p:nvCxnSpPr>
-        <p:spPr>
-          <a:xfrm flipV="1">
-            <a:off x="3643745" y="3560358"/>
-            <a:ext cx="268594" cy="526852"/>
-          </a:xfrm>
-          <a:prstGeom prst="straightConnector1">
-            <a:avLst/>
-          </a:prstGeom>
-          <a:ln w="50800">
-            <a:solidFill>
-              <a:schemeClr val="tx1"/>
-            </a:solidFill>
-            <a:tailEnd type="triangle"/>
-          </a:ln>
-        </p:spPr>
-        <p:style>
-          <a:lnRef idx="1">
-            <a:schemeClr val="accent1"/>
-          </a:lnRef>
-          <a:fillRef idx="0">
-            <a:schemeClr val="accent1"/>
-          </a:fillRef>
-          <a:effectRef idx="0">
-            <a:schemeClr val="accent1"/>
-          </a:effectRef>
-          <a:fontRef idx="minor">
-            <a:schemeClr val="tx1"/>
-          </a:fontRef>
-        </p:style>
-      </p:cxnSp>
-      <p:cxnSp>
-        <p:nvCxnSpPr>
-          <p:cNvPr id="60" name="Straight Arrow Connector 59"/>
-          <p:cNvCxnSpPr>
-            <a:cxnSpLocks/>
-          </p:cNvCxnSpPr>
-          <p:nvPr/>
-        </p:nvCxnSpPr>
-        <p:spPr>
-          <a:xfrm flipV="1">
-            <a:off x="6923314" y="3610835"/>
-            <a:ext cx="184068" cy="433996"/>
-          </a:xfrm>
-          <a:prstGeom prst="straightConnector1">
-            <a:avLst/>
-          </a:prstGeom>
-          <a:ln w="50800">
-            <a:solidFill>
-              <a:schemeClr val="tx1"/>
-            </a:solidFill>
-            <a:tailEnd type="triangle"/>
-          </a:ln>
-        </p:spPr>
-        <p:style>
-          <a:lnRef idx="1">
-            <a:schemeClr val="accent1"/>
-          </a:lnRef>
-          <a:fillRef idx="0">
-            <a:schemeClr val="accent1"/>
-          </a:fillRef>
-          <a:effectRef idx="0">
-            <a:schemeClr val="accent1"/>
-          </a:effectRef>
-          <a:fontRef idx="minor">
-            <a:schemeClr val="tx1"/>
-          </a:fontRef>
-        </p:style>
-      </p:cxnSp>
-      <p:cxnSp>
-        <p:nvCxnSpPr>
-          <p:cNvPr id="63" name="Straight Arrow Connector 62"/>
-          <p:cNvCxnSpPr/>
-          <p:nvPr/>
-        </p:nvCxnSpPr>
-        <p:spPr>
-          <a:xfrm flipV="1">
-            <a:off x="9915069" y="3610835"/>
-            <a:ext cx="46901" cy="433996"/>
-          </a:xfrm>
-          <a:prstGeom prst="straightConnector1">
-            <a:avLst/>
-          </a:prstGeom>
-          <a:ln w="50800">
-            <a:solidFill>
-              <a:schemeClr val="tx1"/>
-            </a:solidFill>
-            <a:tailEnd type="triangle"/>
-          </a:ln>
-        </p:spPr>
-        <p:style>
-          <a:lnRef idx="1">
-            <a:schemeClr val="accent1"/>
-          </a:lnRef>
-          <a:fillRef idx="0">
-            <a:schemeClr val="accent1"/>
-          </a:fillRef>
-          <a:effectRef idx="0">
-            <a:schemeClr val="accent1"/>
-          </a:effectRef>
-          <a:fontRef idx="minor">
-            <a:schemeClr val="tx1"/>
-          </a:fontRef>
-        </p:style>
-      </p:cxnSp>
-      <p:sp>
-        <p:nvSpPr>
-          <p:cNvPr id="66" name="Rectangle 65"/>
-          <p:cNvSpPr/>
-          <p:nvPr/>
-        </p:nvSpPr>
-        <p:spPr>
-          <a:xfrm>
-            <a:off x="3924229" y="75577"/>
-            <a:ext cx="5344244" cy="1356491"/>
-          </a:xfrm>
-          <a:prstGeom prst="rect">
-            <a:avLst/>
-          </a:prstGeom>
-          <a:solidFill>
-            <a:schemeClr val="accent4">
-              <a:lumMod val="75000"/>
-            </a:schemeClr>
-          </a:solidFill>
-        </p:spPr>
-        <p:style>
-          <a:lnRef idx="2">
-            <a:schemeClr val="accent1">
-              <a:shade val="50000"/>
-            </a:schemeClr>
-          </a:lnRef>
-          <a:fillRef idx="1">
-            <a:schemeClr val="accent1"/>
-          </a:fillRef>
-          <a:effectRef idx="0">
-            <a:schemeClr val="accent1"/>
-          </a:effectRef>
-          <a:fontRef idx="minor">
-            <a:schemeClr val="lt1"/>
-          </a:fontRef>
-        </p:style>
-        <p:txBody>
-          <a:bodyPr rtlCol="0" anchor="ctr"/>
-          <a:lstStyle/>
-          <a:p>
-            <a:r>
-              <a:rPr lang="en-US" sz="1600" dirty="0"/>
-              <a:t>Prostate: 7000 </a:t>
-            </a:r>
-            <a:r>
-              <a:rPr lang="en-US" sz="1600" dirty="0" err="1"/>
-              <a:t>cGy</a:t>
-            </a:r>
-            <a:r>
-              <a:rPr lang="en-US" sz="1600" dirty="0"/>
-              <a:t> in 35 fractions</a:t>
-            </a:r>
-          </a:p>
-          <a:p>
-            <a:r>
-              <a:rPr lang="en-US" sz="1600" dirty="0"/>
-              <a:t>SV:  6000 </a:t>
-            </a:r>
-            <a:r>
-              <a:rPr lang="en-US" sz="1600" dirty="0" err="1"/>
-              <a:t>cGy</a:t>
-            </a:r>
-            <a:r>
-              <a:rPr lang="en-US" sz="1600" dirty="0"/>
-              <a:t> in 30 fractions</a:t>
-            </a:r>
-          </a:p>
-          <a:p>
-            <a:r>
-              <a:rPr lang="en-US" sz="1600" dirty="0"/>
-              <a:t>Pelvic Nodes: 4500 </a:t>
-            </a:r>
-            <a:r>
-              <a:rPr lang="en-US" sz="1600" dirty="0" err="1"/>
-              <a:t>cGy</a:t>
-            </a:r>
-            <a:r>
-              <a:rPr lang="en-US" sz="1600" dirty="0"/>
-              <a:t>  in 25 fractions</a:t>
-            </a:r>
-          </a:p>
-          <a:p>
-            <a:r>
-              <a:rPr lang="en-US" sz="1600" dirty="0"/>
-              <a:t>All treated in 35 sessions</a:t>
-            </a:r>
-          </a:p>
-          <a:p>
-            <a:r>
-              <a:rPr lang="en-US" sz="1600" dirty="0"/>
-              <a:t>Over 49  days</a:t>
-            </a:r>
-          </a:p>
-        </p:txBody>
-      </p:sp>
-      <p:cxnSp>
-        <p:nvCxnSpPr>
-          <p:cNvPr id="69" name="Straight Arrow Connector 68"/>
-          <p:cNvCxnSpPr>
-            <a:cxnSpLocks/>
-          </p:cNvCxnSpPr>
-          <p:nvPr/>
-        </p:nvCxnSpPr>
-        <p:spPr>
-          <a:xfrm flipV="1">
-            <a:off x="4823545" y="1495398"/>
-            <a:ext cx="177837" cy="236715"/>
-          </a:xfrm>
-          <a:prstGeom prst="straightConnector1">
-            <a:avLst/>
-          </a:prstGeom>
-          <a:ln w="50800">
-            <a:solidFill>
-              <a:schemeClr val="tx1"/>
-            </a:solidFill>
-            <a:tailEnd type="triangle"/>
-          </a:ln>
-        </p:spPr>
-        <p:style>
-          <a:lnRef idx="1">
-            <a:schemeClr val="accent1"/>
-          </a:lnRef>
-          <a:fillRef idx="0">
-            <a:schemeClr val="accent1"/>
-          </a:fillRef>
-          <a:effectRef idx="0">
-            <a:schemeClr val="accent1"/>
-          </a:effectRef>
-          <a:fontRef idx="minor">
-            <a:schemeClr val="tx1"/>
-          </a:fontRef>
-        </p:style>
-      </p:cxnSp>
-      <p:sp>
-        <p:nvSpPr>
-          <p:cNvPr id="23" name="Rectangle 22"/>
-          <p:cNvSpPr/>
-          <p:nvPr/>
-        </p:nvSpPr>
-        <p:spPr>
-          <a:xfrm>
-            <a:off x="6334469" y="1762177"/>
-            <a:ext cx="2296913" cy="1798181"/>
-          </a:xfrm>
-          <a:prstGeom prst="rect">
-            <a:avLst/>
-          </a:prstGeom>
-          <a:solidFill>
-            <a:srgbClr val="002060"/>
-          </a:solidFill>
-        </p:spPr>
-        <p:style>
-          <a:lnRef idx="2">
-            <a:schemeClr val="accent1">
-              <a:shade val="50000"/>
-            </a:schemeClr>
-          </a:lnRef>
-          <a:fillRef idx="1">
-            <a:schemeClr val="accent1"/>
-          </a:fillRef>
-          <a:effectRef idx="0">
-            <a:schemeClr val="accent1"/>
-          </a:effectRef>
-          <a:fontRef idx="minor">
-            <a:schemeClr val="lt1"/>
-          </a:fontRef>
-        </p:style>
-        <p:txBody>
-          <a:bodyPr rtlCol="0" anchor="t" anchorCtr="0"/>
-          <a:lstStyle/>
-          <a:p>
-            <a:r>
-              <a:rPr lang="en-US" sz="1600" dirty="0"/>
-              <a:t>Phase Name: Boost 1</a:t>
-            </a:r>
-          </a:p>
-          <a:p>
-            <a:r>
-              <a:rPr lang="en-US" sz="1400" dirty="0"/>
-              <a:t>Target Volumes</a:t>
-            </a:r>
-          </a:p>
-          <a:p>
-            <a:pPr lvl="1">
-              <a:buFont typeface="Arial" panose="020B0604020202020204" pitchFamily="34" charset="0"/>
-              <a:buChar char="•"/>
-            </a:pPr>
-            <a:r>
-              <a:rPr lang="en-US" sz="1400" dirty="0"/>
-              <a:t>    Prostate: 1000 </a:t>
-            </a:r>
-            <a:r>
-              <a:rPr lang="en-US" sz="1400" dirty="0" err="1"/>
-              <a:t>cGy</a:t>
-            </a:r>
-            <a:endParaRPr lang="en-US" sz="1400" dirty="0"/>
-          </a:p>
-          <a:p>
-            <a:pPr lvl="1">
-              <a:buFont typeface="Arial" panose="020B0604020202020204" pitchFamily="34" charset="0"/>
-              <a:buChar char="•"/>
-            </a:pPr>
-            <a:r>
-              <a:rPr lang="en-US" sz="1400" dirty="0"/>
-              <a:t>    SV: 1000 </a:t>
-            </a:r>
-            <a:r>
-              <a:rPr lang="en-US" sz="1400" dirty="0" err="1"/>
-              <a:t>cGy</a:t>
-            </a:r>
-            <a:endParaRPr lang="en-US" sz="1400" dirty="0"/>
-          </a:p>
-          <a:p>
-            <a:r>
-              <a:rPr lang="en-US" sz="1400" dirty="0"/>
-              <a:t>Treated in 5  phase fractions </a:t>
-            </a:r>
-          </a:p>
-          <a:p>
-            <a:r>
-              <a:rPr lang="en-US" sz="1400" dirty="0"/>
-              <a:t>using Photons VMAT</a:t>
-            </a:r>
-          </a:p>
-        </p:txBody>
-      </p:sp>
-      <p:sp>
-        <p:nvSpPr>
-          <p:cNvPr id="24" name="Rectangle 23"/>
-          <p:cNvSpPr/>
-          <p:nvPr/>
-        </p:nvSpPr>
-        <p:spPr>
-          <a:xfrm>
-            <a:off x="8995362" y="1762177"/>
-            <a:ext cx="2583680" cy="1798181"/>
-          </a:xfrm>
-          <a:prstGeom prst="rect">
-            <a:avLst/>
-          </a:prstGeom>
-          <a:solidFill>
-            <a:srgbClr val="002060"/>
-          </a:solidFill>
-        </p:spPr>
-        <p:style>
-          <a:lnRef idx="2">
-            <a:schemeClr val="accent1">
-              <a:shade val="50000"/>
-            </a:schemeClr>
-          </a:lnRef>
-          <a:fillRef idx="1">
-            <a:schemeClr val="accent1"/>
-          </a:fillRef>
-          <a:effectRef idx="0">
-            <a:schemeClr val="accent1"/>
-          </a:effectRef>
-          <a:fontRef idx="minor">
-            <a:schemeClr val="lt1"/>
-          </a:fontRef>
-        </p:style>
-        <p:txBody>
-          <a:bodyPr rtlCol="0" anchor="t" anchorCtr="0"/>
-          <a:lstStyle/>
-          <a:p>
-            <a:r>
-              <a:rPr lang="en-US" sz="1600" dirty="0"/>
-              <a:t>Rx Phase Name: Boost 2</a:t>
-            </a:r>
-          </a:p>
-          <a:p>
-            <a:r>
-              <a:rPr lang="en-US" sz="1400" dirty="0"/>
-              <a:t>Target Volumes</a:t>
-            </a:r>
-          </a:p>
-          <a:p>
-            <a:pPr lvl="1">
-              <a:buFont typeface="Arial" panose="020B0604020202020204" pitchFamily="34" charset="0"/>
-              <a:buChar char="•"/>
-            </a:pPr>
-            <a:r>
-              <a:rPr lang="en-US" sz="1400" dirty="0"/>
-              <a:t>    Prostate: 1000</a:t>
-            </a:r>
-          </a:p>
-          <a:p>
-            <a:r>
-              <a:rPr lang="en-US" sz="1400" dirty="0"/>
-              <a:t>Treated in 5 phase  fractions</a:t>
-            </a:r>
-          </a:p>
-          <a:p>
-            <a:r>
-              <a:rPr lang="en-US" sz="1400" dirty="0"/>
-              <a:t>using Photons VMAT</a:t>
-            </a:r>
-          </a:p>
-        </p:txBody>
-      </p:sp>
-      <p:cxnSp>
-        <p:nvCxnSpPr>
-          <p:cNvPr id="36" name="Straight Arrow Connector 35"/>
-          <p:cNvCxnSpPr>
-            <a:cxnSpLocks/>
-          </p:cNvCxnSpPr>
-          <p:nvPr/>
-        </p:nvCxnSpPr>
-        <p:spPr>
-          <a:xfrm flipV="1">
-            <a:off x="7406670" y="1433683"/>
-            <a:ext cx="0" cy="298430"/>
-          </a:xfrm>
-          <a:prstGeom prst="straightConnector1">
-            <a:avLst/>
-          </a:prstGeom>
-          <a:ln w="50800">
-            <a:solidFill>
-              <a:schemeClr val="tx1"/>
-            </a:solidFill>
-            <a:tailEnd type="triangle"/>
-          </a:ln>
-        </p:spPr>
-        <p:style>
-          <a:lnRef idx="1">
-            <a:schemeClr val="accent1"/>
-          </a:lnRef>
-          <a:fillRef idx="0">
-            <a:schemeClr val="accent1"/>
-          </a:fillRef>
-          <a:effectRef idx="0">
-            <a:schemeClr val="accent1"/>
-          </a:effectRef>
-          <a:fontRef idx="minor">
-            <a:schemeClr val="tx1"/>
-          </a:fontRef>
-        </p:style>
-      </p:cxnSp>
-      <p:cxnSp>
-        <p:nvCxnSpPr>
-          <p:cNvPr id="38" name="Straight Arrow Connector 37"/>
-          <p:cNvCxnSpPr/>
-          <p:nvPr/>
-        </p:nvCxnSpPr>
-        <p:spPr>
-          <a:xfrm flipH="1" flipV="1">
-            <a:off x="9198982" y="1475463"/>
-            <a:ext cx="138982" cy="270210"/>
-          </a:xfrm>
-          <a:prstGeom prst="straightConnector1">
-            <a:avLst/>
-          </a:prstGeom>
-          <a:ln w="50800">
-            <a:solidFill>
-              <a:schemeClr val="tx1"/>
-            </a:solidFill>
-            <a:tailEnd type="triangle"/>
-          </a:ln>
-        </p:spPr>
-        <p:style>
-          <a:lnRef idx="1">
-            <a:schemeClr val="accent1"/>
-          </a:lnRef>
-          <a:fillRef idx="0">
-            <a:schemeClr val="accent1"/>
-          </a:fillRef>
-          <a:effectRef idx="0">
-            <a:schemeClr val="accent1"/>
-          </a:effectRef>
-          <a:fontRef idx="minor">
-            <a:schemeClr val="tx1"/>
-          </a:fontRef>
-        </p:style>
-      </p:cxnSp>
-      <p:sp>
-        <p:nvSpPr>
-          <p:cNvPr id="26" name="Rectangle 25">
+      <p:sp>
+        <p:nvSpPr>
+          <p:cNvPr id="3" name="TextBox 2">
             <a:extLst>
               <a:ext uri="{FF2B5EF4-FFF2-40B4-BE49-F238E27FC236}">
-                <a16:creationId xmlns:a16="http://schemas.microsoft.com/office/drawing/2014/main" id="{A4602A46-24FF-4997-9693-7872F0AA456D}"/>
-              </a:ext>
-            </a:extLst>
-          </p:cNvPr>
-          <p:cNvSpPr/>
-          <p:nvPr/>
-        </p:nvSpPr>
-        <p:spPr>
-          <a:xfrm>
-            <a:off x="2533397" y="4118939"/>
-            <a:ext cx="2220695" cy="614601"/>
-          </a:xfrm>
-          <a:prstGeom prst="rect">
-            <a:avLst/>
-          </a:prstGeom>
-          <a:solidFill>
-            <a:schemeClr val="accent2">
-              <a:lumMod val="75000"/>
-            </a:schemeClr>
-          </a:solidFill>
-        </p:spPr>
-        <p:style>
-          <a:lnRef idx="2">
-            <a:schemeClr val="accent1">
-              <a:shade val="50000"/>
-            </a:schemeClr>
-          </a:lnRef>
-          <a:fillRef idx="1">
-            <a:schemeClr val="accent1"/>
-          </a:fillRef>
-          <a:effectRef idx="0">
-            <a:schemeClr val="accent1"/>
-          </a:effectRef>
-          <a:fontRef idx="minor">
-            <a:schemeClr val="lt1"/>
-          </a:fontRef>
-        </p:style>
-        <p:txBody>
-          <a:bodyPr rtlCol="0" anchor="ctr"/>
-          <a:lstStyle/>
-          <a:p>
-            <a:pPr algn="ctr"/>
-            <a:r>
-              <a:rPr lang="en-US" sz="1600" dirty="0"/>
-              <a:t>Pelvis</a:t>
-            </a:r>
-          </a:p>
-          <a:p>
-            <a:pPr algn="ctr"/>
-            <a:r>
-              <a:rPr lang="en-US" sz="1100" i="1" dirty="0"/>
-              <a:t>(25 delivered of 25 planned)</a:t>
-            </a:r>
-          </a:p>
-        </p:txBody>
-      </p:sp>
-      <p:sp>
-        <p:nvSpPr>
-          <p:cNvPr id="13" name="TextBox 12">
-            <a:extLst>
-              <a:ext uri="{FF2B5EF4-FFF2-40B4-BE49-F238E27FC236}">
-                <a16:creationId xmlns:a16="http://schemas.microsoft.com/office/drawing/2014/main" id="{F6147ABC-FFCB-4AC1-BA12-57964C6A57FA}"/>
+                <a16:creationId xmlns:a16="http://schemas.microsoft.com/office/drawing/2014/main" id="{3B467650-1937-4D28-B536-BB21091340CD}"/>
               </a:ext>
             </a:extLst>
           </p:cNvPr>
@@ -4254,8 +3345,8 @@
         </p:nvSpPr>
         <p:spPr>
           <a:xfrm>
-            <a:off x="9915069" y="437745"/>
-            <a:ext cx="1014124" cy="369332"/>
+            <a:off x="1606609" y="1153682"/>
+            <a:ext cx="4481227" cy="1477328"/>
           </a:xfrm>
           <a:prstGeom prst="rect">
             <a:avLst/>
@@ -4270,45 +3361,68 @@
           <a:p>
             <a:r>
               <a:rPr lang="en-US" dirty="0"/>
-              <a:t>Prostate </a:t>
-            </a:r>
-          </a:p>
-        </p:txBody>
-      </p:sp>
-      <p:pic>
-        <p:nvPicPr>
-          <p:cNvPr id="14" name="Picture 13">
-            <a:extLst>
-              <a:ext uri="{FF2B5EF4-FFF2-40B4-BE49-F238E27FC236}">
-                <a16:creationId xmlns:a16="http://schemas.microsoft.com/office/drawing/2014/main" id="{4813169A-28BD-4647-938D-7E528CD3EFE9}"/>
-              </a:ext>
-            </a:extLst>
-          </p:cNvPr>
-          <p:cNvPicPr>
-            <a:picLocks noChangeAspect="1"/>
-          </p:cNvPicPr>
-          <p:nvPr/>
-        </p:nvPicPr>
-        <p:blipFill>
-          <a:blip r:embed="rId2"/>
-          <a:stretch>
-            <a:fillRect/>
-          </a:stretch>
-        </p:blipFill>
-        <p:spPr>
-          <a:xfrm>
-            <a:off x="1192634" y="5034811"/>
-            <a:ext cx="9915069" cy="1680660"/>
-          </a:xfrm>
-          <a:prstGeom prst="rect">
-            <a:avLst/>
-          </a:prstGeom>
-        </p:spPr>
-      </p:pic>
+              <a:t>To create the figures for </a:t>
+            </a:r>
+            <a:r>
+              <a:rPr lang="en-US" dirty="0" err="1"/>
+              <a:t>CodeX</a:t>
+            </a:r>
+            <a:r>
+              <a:rPr lang="en-US" dirty="0"/>
+              <a:t> RT</a:t>
+            </a:r>
+          </a:p>
+          <a:p>
+            <a:pPr marL="285750" indent="-285750">
+              <a:buFontTx/>
+              <a:buChar char="-"/>
+            </a:pPr>
+            <a:r>
+              <a:rPr lang="en-US" dirty="0"/>
+              <a:t>select contents to be included in the figure</a:t>
+            </a:r>
+          </a:p>
+          <a:p>
+            <a:pPr marL="285750" indent="-285750">
+              <a:buFontTx/>
+              <a:buChar char="-"/>
+            </a:pPr>
+            <a:r>
+              <a:rPr lang="en-US" dirty="0"/>
+              <a:t>right-click</a:t>
+            </a:r>
+          </a:p>
+          <a:p>
+            <a:pPr marL="285750" indent="-285750">
+              <a:buFontTx/>
+              <a:buChar char="-"/>
+            </a:pPr>
+            <a:r>
+              <a:rPr lang="en-US" dirty="0"/>
+              <a:t>and select “Save as Picture …”</a:t>
+            </a:r>
+          </a:p>
+          <a:p>
+            <a:pPr marL="285750" indent="-285750">
+              <a:buFontTx/>
+              <a:buChar char="-"/>
+            </a:pPr>
+            <a:r>
+              <a:rPr lang="en-US" dirty="0"/>
+              <a:t>Save as *.</a:t>
+            </a:r>
+            <a:r>
+              <a:rPr lang="en-US" dirty="0" err="1"/>
+              <a:t>svg</a:t>
+            </a:r>
+            <a:endParaRPr lang="en-US" dirty="0"/>
+          </a:p>
+        </p:txBody>
+      </p:sp>
     </p:spTree>
     <p:extLst>
       <p:ext uri="{BB962C8B-B14F-4D97-AF65-F5344CB8AC3E}">
-        <p14:creationId xmlns:p14="http://schemas.microsoft.com/office/powerpoint/2010/main" val="1281428247"/>
+        <p14:creationId xmlns:p14="http://schemas.microsoft.com/office/powerpoint/2010/main" val="1737803920"/>
       </p:ext>
     </p:extLst>
   </p:cSld>
@@ -4338,12 +3452,14 @@
       <p:cxnSp>
         <p:nvCxnSpPr>
           <p:cNvPr id="5" name="Straight Connector 4"/>
-          <p:cNvCxnSpPr/>
+          <p:cNvCxnSpPr>
+            <a:cxnSpLocks/>
+          </p:cNvCxnSpPr>
           <p:nvPr/>
         </p:nvCxnSpPr>
         <p:spPr>
           <a:xfrm flipV="1">
-            <a:off x="1039572" y="1626508"/>
+            <a:off x="1298361" y="1655081"/>
             <a:ext cx="10723801" cy="30865"/>
           </a:xfrm>
           <a:prstGeom prst="line">
@@ -4369,12 +3485,14 @@
       <p:cxnSp>
         <p:nvCxnSpPr>
           <p:cNvPr id="6" name="Straight Connector 5"/>
-          <p:cNvCxnSpPr/>
+          <p:cNvCxnSpPr>
+            <a:cxnSpLocks/>
+          </p:cNvCxnSpPr>
           <p:nvPr/>
         </p:nvCxnSpPr>
         <p:spPr>
           <a:xfrm flipV="1">
-            <a:off x="1039573" y="3817488"/>
+            <a:off x="1298361" y="3940067"/>
             <a:ext cx="10723801" cy="12490"/>
           </a:xfrm>
           <a:prstGeom prst="line">
@@ -4405,8 +3523,8 @@
         </p:nvSpPr>
         <p:spPr>
           <a:xfrm>
-            <a:off x="65990" y="4087209"/>
-            <a:ext cx="1990726" cy="646331"/>
+            <a:off x="0" y="4193416"/>
+            <a:ext cx="1990726" cy="307777"/>
           </a:xfrm>
           <a:prstGeom prst="rect">
             <a:avLst/>
@@ -4420,8 +3538,11 @@
           <a:lstStyle/>
           <a:p>
             <a:r>
-              <a:rPr lang="en-US" dirty="0"/>
-              <a:t>Delivered Treatment Plan</a:t>
+              <a:rPr lang="en-US" sz="1400" dirty="0">
+                <a:latin typeface="Verdana" panose="020B0604030504040204" pitchFamily="34" charset="0"/>
+                <a:ea typeface="Verdana" panose="020B0604030504040204" pitchFamily="34" charset="0"/>
+              </a:rPr>
+              <a:t>Treated Plan</a:t>
             </a:r>
           </a:p>
         </p:txBody>
@@ -4434,8 +3555,8 @@
         </p:nvSpPr>
         <p:spPr>
           <a:xfrm>
-            <a:off x="9524" y="1763493"/>
-            <a:ext cx="2276475" cy="369332"/>
+            <a:off x="0" y="1972712"/>
+            <a:ext cx="2276475" cy="307777"/>
           </a:xfrm>
           <a:prstGeom prst="rect">
             <a:avLst/>
@@ -4449,8 +3570,11 @@
           <a:lstStyle/>
           <a:p>
             <a:r>
-              <a:rPr lang="en-US" dirty="0"/>
-              <a:t>Phase Summary</a:t>
+              <a:rPr lang="en-US" sz="1400" dirty="0">
+                <a:latin typeface="Verdana" panose="020B0604030504040204" pitchFamily="34" charset="0"/>
+                <a:ea typeface="Verdana" panose="020B0604030504040204" pitchFamily="34" charset="0"/>
+              </a:rPr>
+              <a:t>Treated Phase</a:t>
             </a:r>
           </a:p>
         </p:txBody>
@@ -4464,7 +3588,7 @@
         <p:spPr>
           <a:xfrm>
             <a:off x="0" y="68413"/>
-            <a:ext cx="1778436" cy="369332"/>
+            <a:ext cx="1749197" cy="307777"/>
           </a:xfrm>
           <a:prstGeom prst="rect">
             <a:avLst/>
@@ -4478,7 +3602,10 @@
           <a:lstStyle/>
           <a:p>
             <a:r>
-              <a:rPr lang="en-US" dirty="0"/>
+              <a:rPr lang="en-US" sz="1400" dirty="0">
+                <a:latin typeface="Verdana" panose="020B0604030504040204" pitchFamily="34" charset="0"/>
+                <a:ea typeface="Verdana" panose="020B0604030504040204" pitchFamily="34" charset="0"/>
+              </a:rPr>
               <a:t>Course Summary</a:t>
             </a:r>
           </a:p>
@@ -4492,8 +3619,8 @@
         </p:nvSpPr>
         <p:spPr>
           <a:xfrm>
-            <a:off x="1951255" y="4063877"/>
-            <a:ext cx="2220695" cy="765981"/>
+            <a:off x="1795980" y="4186456"/>
+            <a:ext cx="2220695" cy="826783"/>
           </a:xfrm>
           <a:prstGeom prst="rect">
             <a:avLst/>
@@ -4526,16 +3653,35 @@
           <a:p>
             <a:pPr algn="ctr"/>
             <a:r>
-              <a:rPr lang="en-US" sz="1600" dirty="0" err="1"/>
+              <a:rPr lang="en-US" sz="1400" dirty="0" err="1">
+                <a:latin typeface="Verdana" panose="020B0604030504040204" pitchFamily="34" charset="0"/>
+                <a:ea typeface="Verdana" panose="020B0604030504040204" pitchFamily="34" charset="0"/>
+              </a:rPr>
               <a:t>Breast_L_Tang</a:t>
             </a:r>
-            <a:endParaRPr lang="en-US" sz="1600" dirty="0"/>
+            <a:endParaRPr lang="en-US" sz="1400" dirty="0">
+              <a:latin typeface="Verdana" panose="020B0604030504040204" pitchFamily="34" charset="0"/>
+              <a:ea typeface="Verdana" panose="020B0604030504040204" pitchFamily="34" charset="0"/>
+            </a:endParaRPr>
           </a:p>
           <a:p>
             <a:pPr algn="ctr"/>
             <a:r>
-              <a:rPr lang="en-US" sz="1100" i="1" dirty="0"/>
-              <a:t>(3 delivered of 16 planned)</a:t>
+              <a:rPr lang="en-US" sz="1100" dirty="0">
+                <a:latin typeface="Verdana" panose="020B0604030504040204" pitchFamily="34" charset="0"/>
+                <a:ea typeface="Verdana" panose="020B0604030504040204" pitchFamily="34" charset="0"/>
+              </a:rPr>
+              <a:t>(3 delivered</a:t>
+            </a:r>
+          </a:p>
+          <a:p>
+            <a:pPr algn="ctr"/>
+            <a:r>
+              <a:rPr lang="en-US" sz="1100" dirty="0">
+                <a:latin typeface="Verdana" panose="020B0604030504040204" pitchFamily="34" charset="0"/>
+                <a:ea typeface="Verdana" panose="020B0604030504040204" pitchFamily="34" charset="0"/>
+              </a:rPr>
+              <a:t>of 16 planned)</a:t>
             </a:r>
           </a:p>
         </p:txBody>
@@ -4548,8 +3694,8 @@
         </p:nvSpPr>
         <p:spPr>
           <a:xfrm>
-            <a:off x="4499193" y="4071345"/>
-            <a:ext cx="2525494" cy="756588"/>
+            <a:off x="4343918" y="4193924"/>
+            <a:ext cx="2525494" cy="816644"/>
           </a:xfrm>
           <a:prstGeom prst="rect">
             <a:avLst/>
@@ -4582,22 +3728,44 @@
           <a:p>
             <a:pPr algn="ctr"/>
             <a:r>
-              <a:rPr lang="en-US" sz="1600" dirty="0"/>
+              <a:rPr lang="en-US" sz="1400" dirty="0">
+                <a:latin typeface="Verdana" panose="020B0604030504040204" pitchFamily="34" charset="0"/>
+                <a:ea typeface="Verdana" panose="020B0604030504040204" pitchFamily="34" charset="0"/>
+              </a:rPr>
               <a:t>Breast_L_Tang:1</a:t>
             </a:r>
           </a:p>
           <a:p>
             <a:pPr algn="ctr"/>
             <a:r>
-              <a:rPr lang="en-US" sz="1100" dirty="0"/>
+              <a:rPr lang="en-US" sz="1100" dirty="0">
+                <a:latin typeface="Verdana" panose="020B0604030504040204" pitchFamily="34" charset="0"/>
+                <a:ea typeface="Verdana" panose="020B0604030504040204" pitchFamily="34" charset="0"/>
+              </a:rPr>
               <a:t>Adaptation</a:t>
             </a:r>
           </a:p>
           <a:p>
             <a:pPr algn="ctr"/>
             <a:r>
-              <a:rPr lang="en-US" sz="1100" dirty="0"/>
-              <a:t>(13 fractions delivered of 13 planned)</a:t>
+              <a:rPr lang="en-US" sz="1100" dirty="0">
+                <a:latin typeface="Verdana" panose="020B0604030504040204" pitchFamily="34" charset="0"/>
+                <a:ea typeface="Verdana" panose="020B0604030504040204" pitchFamily="34" charset="0"/>
+              </a:rPr>
+              <a:t>(13 fractions delivered </a:t>
+            </a:r>
+            <a:br>
+              <a:rPr lang="en-US" sz="1100" dirty="0">
+                <a:latin typeface="Verdana" panose="020B0604030504040204" pitchFamily="34" charset="0"/>
+                <a:ea typeface="Verdana" panose="020B0604030504040204" pitchFamily="34" charset="0"/>
+              </a:rPr>
+            </a:br>
+            <a:r>
+              <a:rPr lang="en-US" sz="1100" dirty="0">
+                <a:latin typeface="Verdana" panose="020B0604030504040204" pitchFamily="34" charset="0"/>
+                <a:ea typeface="Verdana" panose="020B0604030504040204" pitchFamily="34" charset="0"/>
+              </a:rPr>
+              <a:t>of 13 planned)</a:t>
             </a:r>
           </a:p>
         </p:txBody>
@@ -4610,8 +3778,8 @@
         </p:nvSpPr>
         <p:spPr>
           <a:xfrm>
-            <a:off x="7164792" y="4065495"/>
-            <a:ext cx="2220695" cy="765981"/>
+            <a:off x="7009517" y="4188074"/>
+            <a:ext cx="2220695" cy="826783"/>
           </a:xfrm>
           <a:prstGeom prst="rect">
             <a:avLst/>
@@ -4642,16 +3810,38 @@
           <a:p>
             <a:pPr algn="ctr"/>
             <a:r>
-              <a:rPr lang="en-US" sz="1600" dirty="0" err="1"/>
+              <a:rPr lang="en-US" sz="1400" dirty="0" err="1">
+                <a:latin typeface="Verdana" panose="020B0604030504040204" pitchFamily="34" charset="0"/>
+                <a:ea typeface="Verdana" panose="020B0604030504040204" pitchFamily="34" charset="0"/>
+              </a:rPr>
               <a:t>Breast_L_Boost</a:t>
             </a:r>
-            <a:endParaRPr lang="en-US" sz="1600" dirty="0"/>
+            <a:endParaRPr lang="en-US" sz="1400" dirty="0">
+              <a:latin typeface="Verdana" panose="020B0604030504040204" pitchFamily="34" charset="0"/>
+              <a:ea typeface="Verdana" panose="020B0604030504040204" pitchFamily="34" charset="0"/>
+            </a:endParaRPr>
           </a:p>
           <a:p>
             <a:pPr algn="ctr"/>
             <a:r>
-              <a:rPr lang="en-US" sz="1100" i="1" dirty="0"/>
-              <a:t>(4 fractions delivered of 4 planned)</a:t>
+              <a:rPr lang="en-US" sz="1100" dirty="0">
+                <a:latin typeface="Verdana" panose="020B0604030504040204" pitchFamily="34" charset="0"/>
+                <a:ea typeface="Verdana" panose="020B0604030504040204" pitchFamily="34" charset="0"/>
+              </a:rPr>
+              <a:t>(4 fractions delivered </a:t>
+            </a:r>
+            <a:br>
+              <a:rPr lang="en-US" sz="1100" dirty="0">
+                <a:latin typeface="Verdana" panose="020B0604030504040204" pitchFamily="34" charset="0"/>
+                <a:ea typeface="Verdana" panose="020B0604030504040204" pitchFamily="34" charset="0"/>
+              </a:rPr>
+            </a:br>
+            <a:r>
+              <a:rPr lang="en-US" sz="1100" dirty="0">
+                <a:latin typeface="Verdana" panose="020B0604030504040204" pitchFamily="34" charset="0"/>
+                <a:ea typeface="Verdana" panose="020B0604030504040204" pitchFamily="34" charset="0"/>
+              </a:rPr>
+              <a:t>of 4 planned)</a:t>
             </a:r>
           </a:p>
         </p:txBody>
@@ -4664,8 +3854,8 @@
         </p:nvSpPr>
         <p:spPr>
           <a:xfrm>
-            <a:off x="9572625" y="4052512"/>
-            <a:ext cx="2413727" cy="775421"/>
+            <a:off x="9370317" y="4175091"/>
+            <a:ext cx="2426581" cy="836972"/>
           </a:xfrm>
           <a:prstGeom prst="rect">
             <a:avLst/>
@@ -4696,16 +3886,38 @@
           <a:p>
             <a:pPr algn="ctr"/>
             <a:r>
-              <a:rPr lang="en-US" sz="1600" dirty="0" err="1"/>
+              <a:rPr lang="en-US" sz="1400" dirty="0" err="1">
+                <a:latin typeface="Verdana" panose="020B0604030504040204" pitchFamily="34" charset="0"/>
+                <a:ea typeface="Verdana" panose="020B0604030504040204" pitchFamily="34" charset="0"/>
+              </a:rPr>
               <a:t>Breast_R_Tang</a:t>
             </a:r>
-            <a:endParaRPr lang="en-US" sz="1600" dirty="0"/>
+            <a:endParaRPr lang="en-US" sz="1400" dirty="0">
+              <a:latin typeface="Verdana" panose="020B0604030504040204" pitchFamily="34" charset="0"/>
+              <a:ea typeface="Verdana" panose="020B0604030504040204" pitchFamily="34" charset="0"/>
+            </a:endParaRPr>
           </a:p>
           <a:p>
             <a:pPr algn="ctr"/>
             <a:r>
-              <a:rPr lang="en-US" sz="1100" i="1" dirty="0"/>
-              <a:t>(16 fractions delivered of 16 planned )</a:t>
+              <a:rPr lang="en-US" sz="1000" dirty="0">
+                <a:latin typeface="Verdana" panose="020B0604030504040204" pitchFamily="34" charset="0"/>
+                <a:ea typeface="Verdana" panose="020B0604030504040204" pitchFamily="34" charset="0"/>
+              </a:rPr>
+              <a:t>(16 fractions delivered </a:t>
+            </a:r>
+            <a:br>
+              <a:rPr lang="en-US" sz="1000" dirty="0">
+                <a:latin typeface="Verdana" panose="020B0604030504040204" pitchFamily="34" charset="0"/>
+                <a:ea typeface="Verdana" panose="020B0604030504040204" pitchFamily="34" charset="0"/>
+              </a:rPr>
+            </a:br>
+            <a:r>
+              <a:rPr lang="en-US" sz="1000" dirty="0">
+                <a:latin typeface="Verdana" panose="020B0604030504040204" pitchFamily="34" charset="0"/>
+                <a:ea typeface="Verdana" panose="020B0604030504040204" pitchFamily="34" charset="0"/>
+              </a:rPr>
+              <a:t>of 16 planned)</a:t>
             </a:r>
           </a:p>
         </p:txBody>
@@ -4718,8 +3930,8 @@
         </p:nvSpPr>
         <p:spPr>
           <a:xfrm>
-            <a:off x="2056716" y="1879849"/>
-            <a:ext cx="3545458" cy="1582882"/>
+            <a:off x="1536875" y="1967619"/>
+            <a:ext cx="3864629" cy="1782641"/>
           </a:xfrm>
           <a:prstGeom prst="rect">
             <a:avLst/>
@@ -4748,71 +3960,139 @@
           <a:bodyPr rtlCol="0" anchor="ctr"/>
           <a:lstStyle/>
           <a:p>
-            <a:r>
-              <a:rPr lang="en-US" sz="1600" dirty="0"/>
+            <a:pPr>
+              <a:spcAft>
+                <a:spcPts val="200"/>
+              </a:spcAft>
+            </a:pPr>
+            <a:r>
+              <a:rPr lang="en-US" sz="1400" dirty="0">
+                <a:latin typeface="Verdana" panose="020B0604030504040204" pitchFamily="34" charset="0"/>
+                <a:ea typeface="Verdana" panose="020B0604030504040204" pitchFamily="34" charset="0"/>
+              </a:rPr>
               <a:t>Phase Name: Left Breast Tangents</a:t>
             </a:r>
           </a:p>
           <a:p>
-            <a:r>
-              <a:rPr lang="en-US" sz="1400" dirty="0"/>
+            <a:pPr>
+              <a:spcAft>
+                <a:spcPts val="200"/>
+              </a:spcAft>
+            </a:pPr>
+            <a:r>
+              <a:rPr lang="en-US" sz="1200" dirty="0">
+                <a:latin typeface="Verdana" panose="020B0604030504040204" pitchFamily="34" charset="0"/>
+                <a:ea typeface="Verdana" panose="020B0604030504040204" pitchFamily="34" charset="0"/>
+              </a:rPr>
               <a:t>Target Volumes</a:t>
             </a:r>
           </a:p>
           <a:p>
             <a:pPr marL="285750" indent="-115888">
+              <a:spcAft>
+                <a:spcPts val="200"/>
+              </a:spcAft>
               <a:buFont typeface="Arial" panose="020B0604020202020204" pitchFamily="34" charset="0"/>
               <a:buChar char="•"/>
             </a:pPr>
             <a:r>
-              <a:rPr lang="en-US" sz="1400" dirty="0"/>
+              <a:rPr lang="en-US" sz="1200" dirty="0">
+                <a:latin typeface="Verdana" panose="020B0604030504040204" pitchFamily="34" charset="0"/>
+                <a:ea typeface="Verdana" panose="020B0604030504040204" pitchFamily="34" charset="0"/>
+              </a:rPr>
               <a:t>Left Breast : 4256 </a:t>
             </a:r>
             <a:r>
-              <a:rPr lang="en-US" sz="1400" dirty="0" err="1"/>
+              <a:rPr lang="en-US" sz="1200" dirty="0" err="1">
+                <a:latin typeface="Verdana" panose="020B0604030504040204" pitchFamily="34" charset="0"/>
+                <a:ea typeface="Verdana" panose="020B0604030504040204" pitchFamily="34" charset="0"/>
+              </a:rPr>
               <a:t>cGy</a:t>
             </a:r>
-            <a:endParaRPr lang="en-US" sz="1400" dirty="0"/>
+            <a:endParaRPr lang="en-US" sz="1200" dirty="0">
+              <a:latin typeface="Verdana" panose="020B0604030504040204" pitchFamily="34" charset="0"/>
+              <a:ea typeface="Verdana" panose="020B0604030504040204" pitchFamily="34" charset="0"/>
+            </a:endParaRPr>
           </a:p>
           <a:p>
             <a:pPr marL="285750" indent="-115888">
+              <a:spcAft>
+                <a:spcPts val="200"/>
+              </a:spcAft>
               <a:buFont typeface="Arial" panose="020B0604020202020204" pitchFamily="34" charset="0"/>
               <a:buChar char="•"/>
             </a:pPr>
             <a:r>
-              <a:rPr lang="en-US" sz="1400" dirty="0"/>
+              <a:rPr lang="en-US" sz="1200" dirty="0">
+                <a:latin typeface="Verdana" panose="020B0604030504040204" pitchFamily="34" charset="0"/>
+                <a:ea typeface="Verdana" panose="020B0604030504040204" pitchFamily="34" charset="0"/>
+              </a:rPr>
               <a:t>Left Breast Surgical Bed : 4256 </a:t>
             </a:r>
             <a:r>
-              <a:rPr lang="en-US" sz="1400" dirty="0" err="1"/>
+              <a:rPr lang="en-US" sz="1200" dirty="0" err="1">
+                <a:latin typeface="Verdana" panose="020B0604030504040204" pitchFamily="34" charset="0"/>
+                <a:ea typeface="Verdana" panose="020B0604030504040204" pitchFamily="34" charset="0"/>
+              </a:rPr>
               <a:t>cGy</a:t>
             </a:r>
-            <a:endParaRPr lang="en-US" sz="1400" dirty="0"/>
+            <a:endParaRPr lang="en-US" sz="1200" dirty="0">
+              <a:latin typeface="Verdana" panose="020B0604030504040204" pitchFamily="34" charset="0"/>
+              <a:ea typeface="Verdana" panose="020B0604030504040204" pitchFamily="34" charset="0"/>
+            </a:endParaRPr>
           </a:p>
           <a:p>
             <a:pPr marL="285750" indent="-115888">
+              <a:spcAft>
+                <a:spcPts val="200"/>
+              </a:spcAft>
               <a:buFont typeface="Arial" panose="020B0604020202020204" pitchFamily="34" charset="0"/>
               <a:buChar char="•"/>
             </a:pPr>
             <a:r>
-              <a:rPr lang="en-US" sz="1400" dirty="0"/>
+              <a:rPr lang="en-US" sz="1200" dirty="0">
+                <a:latin typeface="Verdana" panose="020B0604030504040204" pitchFamily="34" charset="0"/>
+                <a:ea typeface="Verdana" panose="020B0604030504040204" pitchFamily="34" charset="0"/>
+              </a:rPr>
               <a:t>Left Axillary Nodes, SC and IMN: 4256 </a:t>
             </a:r>
             <a:r>
-              <a:rPr lang="en-US" sz="1400" dirty="0" err="1"/>
+              <a:rPr lang="en-US" sz="1200" dirty="0" err="1">
+                <a:latin typeface="Verdana" panose="020B0604030504040204" pitchFamily="34" charset="0"/>
+                <a:ea typeface="Verdana" panose="020B0604030504040204" pitchFamily="34" charset="0"/>
+              </a:rPr>
               <a:t>cGy</a:t>
             </a:r>
-            <a:endParaRPr lang="en-US" sz="1400" dirty="0"/>
-          </a:p>
-          <a:p>
-            <a:r>
-              <a:rPr lang="en-US" sz="1400" dirty="0"/>
+            <a:endParaRPr lang="en-US" sz="1200" dirty="0">
+              <a:latin typeface="Verdana" panose="020B0604030504040204" pitchFamily="34" charset="0"/>
+              <a:ea typeface="Verdana" panose="020B0604030504040204" pitchFamily="34" charset="0"/>
+            </a:endParaRPr>
+          </a:p>
+          <a:p>
+            <a:pPr>
+              <a:spcAft>
+                <a:spcPts val="200"/>
+              </a:spcAft>
+            </a:pPr>
+            <a:r>
+              <a:rPr lang="en-US" sz="1200" dirty="0">
+                <a:latin typeface="Verdana" panose="020B0604030504040204" pitchFamily="34" charset="0"/>
+                <a:ea typeface="Verdana" panose="020B0604030504040204" pitchFamily="34" charset="0"/>
+              </a:rPr>
               <a:t>Treated in 16 phase fractions</a:t>
             </a:r>
           </a:p>
           <a:p>
-            <a:r>
-              <a:rPr lang="en-US" sz="1400" dirty="0"/>
+            <a:pPr>
+              <a:spcAft>
+                <a:spcPts val="200"/>
+              </a:spcAft>
+            </a:pPr>
+            <a:r>
+              <a:rPr lang="en-US" sz="1200" dirty="0">
+                <a:latin typeface="Verdana" panose="020B0604030504040204" pitchFamily="34" charset="0"/>
+                <a:ea typeface="Verdana" panose="020B0604030504040204" pitchFamily="34" charset="0"/>
+              </a:rPr>
               <a:t>Using Photons 3D</a:t>
             </a:r>
           </a:p>
@@ -4828,8 +4108,8 @@
         </p:nvCxnSpPr>
         <p:spPr>
           <a:xfrm flipV="1">
-            <a:off x="2689887" y="3490740"/>
-            <a:ext cx="339170" cy="521554"/>
+            <a:off x="2792634" y="3831873"/>
+            <a:ext cx="339170" cy="331079"/>
           </a:xfrm>
           <a:prstGeom prst="straightConnector1">
             <a:avLst/>
@@ -4866,8 +4146,8 @@
         </p:nvCxnSpPr>
         <p:spPr>
           <a:xfrm flipH="1" flipV="1">
-            <a:off x="4794524" y="3516008"/>
-            <a:ext cx="383088" cy="506751"/>
+            <a:off x="4644756" y="3821408"/>
+            <a:ext cx="339170" cy="341544"/>
           </a:xfrm>
           <a:prstGeom prst="straightConnector1">
             <a:avLst/>
@@ -4902,8 +4182,8 @@
         </p:nvSpPr>
         <p:spPr>
           <a:xfrm>
-            <a:off x="5712053" y="1878868"/>
-            <a:ext cx="3006270" cy="1327141"/>
+            <a:off x="5479143" y="1967619"/>
+            <a:ext cx="3213135" cy="1380573"/>
           </a:xfrm>
           <a:prstGeom prst="rect">
             <a:avLst/>
@@ -4932,41 +4212,85 @@
           <a:bodyPr rtlCol="0" anchor="ctr"/>
           <a:lstStyle/>
           <a:p>
-            <a:r>
-              <a:rPr lang="en-US" sz="1600" dirty="0"/>
+            <a:pPr>
+              <a:spcAft>
+                <a:spcPts val="200"/>
+              </a:spcAft>
+            </a:pPr>
+            <a:r>
+              <a:rPr lang="en-US" sz="1400" dirty="0">
+                <a:latin typeface="Verdana" panose="020B0604030504040204" pitchFamily="34" charset="0"/>
+                <a:ea typeface="Verdana" panose="020B0604030504040204" pitchFamily="34" charset="0"/>
+              </a:rPr>
               <a:t>Phase Name: Left Breast Boost</a:t>
             </a:r>
           </a:p>
           <a:p>
-            <a:r>
-              <a:rPr lang="en-US" sz="1400" dirty="0"/>
+            <a:pPr>
+              <a:spcAft>
+                <a:spcPts val="200"/>
+              </a:spcAft>
+            </a:pPr>
+            <a:r>
+              <a:rPr lang="en-US" sz="1200" dirty="0">
+                <a:latin typeface="Verdana" panose="020B0604030504040204" pitchFamily="34" charset="0"/>
+                <a:ea typeface="Verdana" panose="020B0604030504040204" pitchFamily="34" charset="0"/>
+              </a:rPr>
               <a:t>Target Volumes</a:t>
             </a:r>
           </a:p>
           <a:p>
             <a:pPr marL="285750" indent="-115888">
+              <a:spcAft>
+                <a:spcPts val="200"/>
+              </a:spcAft>
               <a:buFont typeface="Arial" panose="020B0604020202020204" pitchFamily="34" charset="0"/>
               <a:buChar char="•"/>
             </a:pPr>
             <a:r>
-              <a:rPr lang="en-US" sz="1400" dirty="0"/>
+              <a:rPr lang="en-US" sz="1200" dirty="0">
+                <a:latin typeface="Verdana" panose="020B0604030504040204" pitchFamily="34" charset="0"/>
+                <a:ea typeface="Verdana" panose="020B0604030504040204" pitchFamily="34" charset="0"/>
+              </a:rPr>
               <a:t>Left Breast Surgical Bed: 1000 </a:t>
             </a:r>
             <a:r>
-              <a:rPr lang="en-US" sz="1400" dirty="0" err="1"/>
+              <a:rPr lang="en-US" sz="1200" dirty="0" err="1">
+                <a:latin typeface="Verdana" panose="020B0604030504040204" pitchFamily="34" charset="0"/>
+                <a:ea typeface="Verdana" panose="020B0604030504040204" pitchFamily="34" charset="0"/>
+              </a:rPr>
               <a:t>cGy</a:t>
             </a:r>
-            <a:endParaRPr lang="en-US" sz="1400" dirty="0"/>
-          </a:p>
-          <a:p>
-            <a:r>
-              <a:rPr lang="en-US" sz="1400" dirty="0"/>
+            <a:endParaRPr lang="en-US" sz="1200" dirty="0">
+              <a:latin typeface="Verdana" panose="020B0604030504040204" pitchFamily="34" charset="0"/>
+              <a:ea typeface="Verdana" panose="020B0604030504040204" pitchFamily="34" charset="0"/>
+            </a:endParaRPr>
+          </a:p>
+          <a:p>
+            <a:pPr>
+              <a:spcAft>
+                <a:spcPts val="200"/>
+              </a:spcAft>
+            </a:pPr>
+            <a:r>
+              <a:rPr lang="en-US" sz="1200" dirty="0">
+                <a:latin typeface="Verdana" panose="020B0604030504040204" pitchFamily="34" charset="0"/>
+                <a:ea typeface="Verdana" panose="020B0604030504040204" pitchFamily="34" charset="0"/>
+              </a:rPr>
               <a:t>Treated in 4 phase fractions</a:t>
             </a:r>
           </a:p>
           <a:p>
-            <a:r>
-              <a:rPr lang="en-US" sz="1400" dirty="0"/>
+            <a:pPr>
+              <a:spcAft>
+                <a:spcPts val="200"/>
+              </a:spcAft>
+            </a:pPr>
+            <a:r>
+              <a:rPr lang="en-US" sz="1200" dirty="0">
+                <a:latin typeface="Verdana" panose="020B0604030504040204" pitchFamily="34" charset="0"/>
+                <a:ea typeface="Verdana" panose="020B0604030504040204" pitchFamily="34" charset="0"/>
+              </a:rPr>
               <a:t>Using Electrons 3D</a:t>
             </a:r>
           </a:p>
@@ -4980,8 +4304,8 @@
         </p:nvSpPr>
         <p:spPr>
           <a:xfrm>
-            <a:off x="8828202" y="1878868"/>
-            <a:ext cx="3006270" cy="1342342"/>
+            <a:off x="8769914" y="1967619"/>
+            <a:ext cx="3422085" cy="1384792"/>
           </a:xfrm>
           <a:prstGeom prst="rect">
             <a:avLst/>
@@ -5010,41 +4334,85 @@
           <a:bodyPr rtlCol="0" anchor="ctr"/>
           <a:lstStyle/>
           <a:p>
-            <a:r>
-              <a:rPr lang="en-US" sz="1600" dirty="0"/>
+            <a:pPr>
+              <a:spcAft>
+                <a:spcPts val="200"/>
+              </a:spcAft>
+            </a:pPr>
+            <a:r>
+              <a:rPr lang="en-US" sz="1400" dirty="0">
+                <a:latin typeface="Verdana" panose="020B0604030504040204" pitchFamily="34" charset="0"/>
+                <a:ea typeface="Verdana" panose="020B0604030504040204" pitchFamily="34" charset="0"/>
+              </a:rPr>
               <a:t>Phase Name: Right Breast Tangents</a:t>
             </a:r>
           </a:p>
           <a:p>
-            <a:r>
-              <a:rPr lang="en-US" sz="1400" dirty="0"/>
+            <a:pPr>
+              <a:spcAft>
+                <a:spcPts val="200"/>
+              </a:spcAft>
+            </a:pPr>
+            <a:r>
+              <a:rPr lang="en-US" sz="1200" dirty="0">
+                <a:latin typeface="Verdana" panose="020B0604030504040204" pitchFamily="34" charset="0"/>
+                <a:ea typeface="Verdana" panose="020B0604030504040204" pitchFamily="34" charset="0"/>
+              </a:rPr>
               <a:t>Target Volumes </a:t>
             </a:r>
           </a:p>
           <a:p>
             <a:pPr marL="285750" indent="-115888">
+              <a:spcAft>
+                <a:spcPts val="200"/>
+              </a:spcAft>
               <a:buFont typeface="Arial" panose="020B0604020202020204" pitchFamily="34" charset="0"/>
               <a:buChar char="•"/>
             </a:pPr>
             <a:r>
-              <a:rPr lang="en-US" sz="1400" dirty="0"/>
+              <a:rPr lang="en-US" sz="1200" dirty="0">
+                <a:latin typeface="Verdana" panose="020B0604030504040204" pitchFamily="34" charset="0"/>
+                <a:ea typeface="Verdana" panose="020B0604030504040204" pitchFamily="34" charset="0"/>
+              </a:rPr>
               <a:t>Right Breast : 4256 </a:t>
             </a:r>
             <a:r>
-              <a:rPr lang="en-US" sz="1400" dirty="0" err="1"/>
+              <a:rPr lang="en-US" sz="1200" dirty="0" err="1">
+                <a:latin typeface="Verdana" panose="020B0604030504040204" pitchFamily="34" charset="0"/>
+                <a:ea typeface="Verdana" panose="020B0604030504040204" pitchFamily="34" charset="0"/>
+              </a:rPr>
               <a:t>cGy</a:t>
             </a:r>
-            <a:endParaRPr lang="en-US" sz="1400" dirty="0"/>
-          </a:p>
-          <a:p>
-            <a:r>
-              <a:rPr lang="en-US" sz="1400" dirty="0"/>
+            <a:endParaRPr lang="en-US" sz="1200" dirty="0">
+              <a:latin typeface="Verdana" panose="020B0604030504040204" pitchFamily="34" charset="0"/>
+              <a:ea typeface="Verdana" panose="020B0604030504040204" pitchFamily="34" charset="0"/>
+            </a:endParaRPr>
+          </a:p>
+          <a:p>
+            <a:pPr>
+              <a:spcAft>
+                <a:spcPts val="200"/>
+              </a:spcAft>
+            </a:pPr>
+            <a:r>
+              <a:rPr lang="en-US" sz="1200" dirty="0">
+                <a:latin typeface="Verdana" panose="020B0604030504040204" pitchFamily="34" charset="0"/>
+                <a:ea typeface="Verdana" panose="020B0604030504040204" pitchFamily="34" charset="0"/>
+              </a:rPr>
               <a:t>Treated in 16 phase fractions</a:t>
             </a:r>
           </a:p>
           <a:p>
-            <a:r>
-              <a:rPr lang="en-US" sz="1400" dirty="0"/>
+            <a:pPr>
+              <a:spcAft>
+                <a:spcPts val="200"/>
+              </a:spcAft>
+            </a:pPr>
+            <a:r>
+              <a:rPr lang="en-US" sz="1200" dirty="0">
+                <a:latin typeface="Verdana" panose="020B0604030504040204" pitchFamily="34" charset="0"/>
+                <a:ea typeface="Verdana" panose="020B0604030504040204" pitchFamily="34" charset="0"/>
+              </a:rPr>
               <a:t>Using Photons 3D</a:t>
             </a:r>
           </a:p>
@@ -5060,8 +4428,8 @@
         </p:nvCxnSpPr>
         <p:spPr>
           <a:xfrm flipV="1">
-            <a:off x="7839790" y="3259237"/>
-            <a:ext cx="0" cy="753057"/>
+            <a:off x="7684515" y="3441684"/>
+            <a:ext cx="0" cy="684597"/>
           </a:xfrm>
           <a:prstGeom prst="straightConnector1">
             <a:avLst/>
@@ -5098,8 +4466,8 @@
         </p:nvCxnSpPr>
         <p:spPr>
           <a:xfrm flipV="1">
-            <a:off x="10540380" y="3259237"/>
-            <a:ext cx="0" cy="770562"/>
+            <a:off x="10385105" y="3442480"/>
+            <a:ext cx="0" cy="700511"/>
           </a:xfrm>
           <a:prstGeom prst="straightConnector1">
             <a:avLst/>
@@ -5134,7 +4502,7 @@
         </p:nvSpPr>
         <p:spPr>
           <a:xfrm>
-            <a:off x="3887650" y="39840"/>
+            <a:off x="3732375" y="68413"/>
             <a:ext cx="5497837" cy="1322886"/>
           </a:xfrm>
           <a:prstGeom prst="rect">
@@ -5166,72 +4534,128 @@
           <a:bodyPr rtlCol="0" anchor="ctr"/>
           <a:lstStyle/>
           <a:p>
-            <a:r>
-              <a:rPr lang="en-US" sz="1600" dirty="0"/>
+            <a:pPr>
+              <a:spcAft>
+                <a:spcPts val="200"/>
+              </a:spcAft>
+            </a:pPr>
+            <a:r>
+              <a:rPr lang="en-US" sz="1400" dirty="0">
+                <a:latin typeface="Verdana" panose="020B0604030504040204" pitchFamily="34" charset="0"/>
+                <a:ea typeface="Verdana" panose="020B0604030504040204" pitchFamily="34" charset="0"/>
+              </a:rPr>
               <a:t>Left Breast : 4256 </a:t>
             </a:r>
             <a:r>
-              <a:rPr lang="en-US" sz="1600" dirty="0" err="1"/>
+              <a:rPr lang="en-US" sz="1400" dirty="0" err="1">
+                <a:latin typeface="Verdana" panose="020B0604030504040204" pitchFamily="34" charset="0"/>
+                <a:ea typeface="Verdana" panose="020B0604030504040204" pitchFamily="34" charset="0"/>
+              </a:rPr>
               <a:t>cGy</a:t>
             </a:r>
             <a:r>
-              <a:rPr lang="en-US" sz="1600" dirty="0"/>
+              <a:rPr lang="en-US" sz="1400" dirty="0">
+                <a:latin typeface="Verdana" panose="020B0604030504040204" pitchFamily="34" charset="0"/>
+                <a:ea typeface="Verdana" panose="020B0604030504040204" pitchFamily="34" charset="0"/>
+              </a:rPr>
               <a:t> in 16 sessions</a:t>
             </a:r>
           </a:p>
           <a:p>
-            <a:r>
-              <a:rPr lang="en-US" sz="1600" dirty="0"/>
-              <a:t>Left </a:t>
-            </a:r>
-            <a:r>
-              <a:rPr lang="en-US" sz="1600" dirty="0" err="1"/>
-              <a:t>Left</a:t>
-            </a:r>
-            <a:r>
-              <a:rPr lang="en-US" sz="1600" dirty="0"/>
-              <a:t> Axillary Nodes, SC and IMN:  4256 </a:t>
-            </a:r>
-            <a:r>
-              <a:rPr lang="en-US" sz="1600" dirty="0" err="1"/>
+            <a:pPr>
+              <a:spcAft>
+                <a:spcPts val="200"/>
+              </a:spcAft>
+            </a:pPr>
+            <a:r>
+              <a:rPr lang="en-US" sz="1400" dirty="0">
+                <a:latin typeface="Verdana" panose="020B0604030504040204" pitchFamily="34" charset="0"/>
+                <a:ea typeface="Verdana" panose="020B0604030504040204" pitchFamily="34" charset="0"/>
+              </a:rPr>
+              <a:t>Left Axillary Nodes, SC and IMN:  4256 </a:t>
+            </a:r>
+            <a:r>
+              <a:rPr lang="en-US" sz="1400" dirty="0" err="1">
+                <a:latin typeface="Verdana" panose="020B0604030504040204" pitchFamily="34" charset="0"/>
+                <a:ea typeface="Verdana" panose="020B0604030504040204" pitchFamily="34" charset="0"/>
+              </a:rPr>
               <a:t>cGy</a:t>
             </a:r>
             <a:r>
-              <a:rPr lang="en-US" sz="1600" dirty="0"/>
+              <a:rPr lang="en-US" sz="1400" dirty="0">
+                <a:latin typeface="Verdana" panose="020B0604030504040204" pitchFamily="34" charset="0"/>
+                <a:ea typeface="Verdana" panose="020B0604030504040204" pitchFamily="34" charset="0"/>
+              </a:rPr>
               <a:t> in 16 sessions</a:t>
             </a:r>
           </a:p>
           <a:p>
-            <a:r>
-              <a:rPr lang="en-US" sz="1600" dirty="0"/>
+            <a:pPr>
+              <a:spcAft>
+                <a:spcPts val="200"/>
+              </a:spcAft>
+            </a:pPr>
+            <a:r>
+              <a:rPr lang="en-US" sz="1400" dirty="0">
+                <a:latin typeface="Verdana" panose="020B0604030504040204" pitchFamily="34" charset="0"/>
+                <a:ea typeface="Verdana" panose="020B0604030504040204" pitchFamily="34" charset="0"/>
+              </a:rPr>
               <a:t>Left Breast Surgical Bed: 5256 </a:t>
             </a:r>
             <a:r>
-              <a:rPr lang="en-US" sz="1600" dirty="0" err="1"/>
+              <a:rPr lang="en-US" sz="1400" dirty="0" err="1">
+                <a:latin typeface="Verdana" panose="020B0604030504040204" pitchFamily="34" charset="0"/>
+                <a:ea typeface="Verdana" panose="020B0604030504040204" pitchFamily="34" charset="0"/>
+              </a:rPr>
               <a:t>cGy</a:t>
             </a:r>
             <a:r>
-              <a:rPr lang="en-US" sz="1600" dirty="0"/>
+              <a:rPr lang="en-US" sz="1400" dirty="0">
+                <a:latin typeface="Verdana" panose="020B0604030504040204" pitchFamily="34" charset="0"/>
+                <a:ea typeface="Verdana" panose="020B0604030504040204" pitchFamily="34" charset="0"/>
+              </a:rPr>
               <a:t> in 20 sessions</a:t>
             </a:r>
           </a:p>
           <a:p>
-            <a:r>
-              <a:rPr lang="en-US" sz="1600" dirty="0"/>
+            <a:pPr>
+              <a:spcAft>
+                <a:spcPts val="200"/>
+              </a:spcAft>
+            </a:pPr>
+            <a:r>
+              <a:rPr lang="en-US" sz="1400" dirty="0">
+                <a:latin typeface="Verdana" panose="020B0604030504040204" pitchFamily="34" charset="0"/>
+                <a:ea typeface="Verdana" panose="020B0604030504040204" pitchFamily="34" charset="0"/>
+              </a:rPr>
               <a:t>Right Breast: 4256  </a:t>
             </a:r>
             <a:r>
-              <a:rPr lang="en-US" sz="1600" dirty="0" err="1"/>
+              <a:rPr lang="en-US" sz="1400" dirty="0" err="1">
+                <a:latin typeface="Verdana" panose="020B0604030504040204" pitchFamily="34" charset="0"/>
+                <a:ea typeface="Verdana" panose="020B0604030504040204" pitchFamily="34" charset="0"/>
+              </a:rPr>
               <a:t>cGy</a:t>
             </a:r>
             <a:r>
-              <a:rPr lang="en-US" sz="1600" dirty="0"/>
+              <a:rPr lang="en-US" sz="1400" dirty="0">
+                <a:latin typeface="Verdana" panose="020B0604030504040204" pitchFamily="34" charset="0"/>
+                <a:ea typeface="Verdana" panose="020B0604030504040204" pitchFamily="34" charset="0"/>
+              </a:rPr>
               <a:t> in 16 sessions</a:t>
             </a:r>
           </a:p>
           <a:p>
-            <a:r>
-              <a:rPr lang="en-US" sz="1600" dirty="0"/>
+            <a:pPr>
+              <a:spcAft>
+                <a:spcPts val="200"/>
+              </a:spcAft>
+            </a:pPr>
+            <a:r>
+              <a:rPr lang="en-US" sz="1400" dirty="0">
+                <a:latin typeface="Verdana" panose="020B0604030504040204" pitchFamily="34" charset="0"/>
+                <a:ea typeface="Verdana" panose="020B0604030504040204" pitchFamily="34" charset="0"/>
+              </a:rPr>
               <a:t>All treated in 20 sessions over 26 days</a:t>
             </a:r>
           </a:p>
@@ -5240,13 +4664,15 @@
       <p:cxnSp>
         <p:nvCxnSpPr>
           <p:cNvPr id="69" name="Straight Arrow Connector 68"/>
-          <p:cNvCxnSpPr/>
+          <p:cNvCxnSpPr>
+            <a:cxnSpLocks/>
+          </p:cNvCxnSpPr>
           <p:nvPr/>
         </p:nvCxnSpPr>
         <p:spPr>
           <a:xfrm flipV="1">
-            <a:off x="4171950" y="1428765"/>
-            <a:ext cx="300307" cy="364881"/>
+            <a:off x="4087906" y="1457338"/>
+            <a:ext cx="229076" cy="428668"/>
           </a:xfrm>
           <a:prstGeom prst="straightConnector1">
             <a:avLst/>
@@ -5283,8 +4709,8 @@
         </p:nvCxnSpPr>
         <p:spPr>
           <a:xfrm flipV="1">
-            <a:off x="6645738" y="1410779"/>
-            <a:ext cx="0" cy="400851"/>
+            <a:off x="6490463" y="1453813"/>
+            <a:ext cx="0" cy="440936"/>
           </a:xfrm>
           <a:prstGeom prst="straightConnector1">
             <a:avLst/>
@@ -5321,8 +4747,8 @@
         </p:nvCxnSpPr>
         <p:spPr>
           <a:xfrm flipH="1" flipV="1">
-            <a:off x="9048296" y="1454790"/>
-            <a:ext cx="312520" cy="333693"/>
+            <a:off x="8893021" y="1454015"/>
+            <a:ext cx="312520" cy="444145"/>
           </a:xfrm>
           <a:prstGeom prst="straightConnector1">
             <a:avLst/>
@@ -5363,8 +4789,8 @@
         </p:nvSpPr>
         <p:spPr>
           <a:xfrm>
-            <a:off x="9714031" y="223285"/>
-            <a:ext cx="2130913" cy="646331"/>
+            <a:off x="9477185" y="404763"/>
+            <a:ext cx="2130913" cy="523220"/>
           </a:xfrm>
           <a:prstGeom prst="rect">
             <a:avLst/>
@@ -5378,7 +4804,10 @@
           <a:lstStyle/>
           <a:p>
             <a:r>
-              <a:rPr lang="en-US" dirty="0"/>
+              <a:rPr lang="en-US" sz="1400" dirty="0">
+                <a:latin typeface="Verdana" panose="020B0604030504040204" pitchFamily="34" charset="0"/>
+                <a:ea typeface="Verdana" panose="020B0604030504040204" pitchFamily="34" charset="0"/>
+              </a:rPr>
               <a:t>Bilateral Breast with Plan Adaptation </a:t>
             </a:r>
           </a:p>
@@ -5406,7 +4835,7 @@
         </p:blipFill>
         <p:spPr>
           <a:xfrm>
-            <a:off x="2121825" y="4968947"/>
+            <a:off x="1647380" y="5032024"/>
             <a:ext cx="7948349" cy="1883233"/>
           </a:xfrm>
           <a:prstGeom prst="rect">
@@ -5417,7 +4846,7 @@
     </p:spTree>
     <p:extLst>
       <p:ext uri="{BB962C8B-B14F-4D97-AF65-F5344CB8AC3E}">
-        <p14:creationId xmlns:p14="http://schemas.microsoft.com/office/powerpoint/2010/main" val="2925579626"/>
+        <p14:creationId xmlns:p14="http://schemas.microsoft.com/office/powerpoint/2010/main" val="4289888368"/>
       </p:ext>
     </p:extLst>
   </p:cSld>
@@ -5444,6 +4873,83 @@
           <a:chExt cx="0" cy="0"/>
         </a:xfrm>
       </p:grpSpPr>
+      <p:sp>
+        <p:nvSpPr>
+          <p:cNvPr id="3" name="TextBox 2">
+            <a:extLst>
+              <a:ext uri="{FF2B5EF4-FFF2-40B4-BE49-F238E27FC236}">
+                <a16:creationId xmlns:a16="http://schemas.microsoft.com/office/drawing/2014/main" id="{3B467650-1937-4D28-B536-BB21091340CD}"/>
+              </a:ext>
+            </a:extLst>
+          </p:cNvPr>
+          <p:cNvSpPr txBox="1"/>
+          <p:nvPr/>
+        </p:nvSpPr>
+        <p:spPr>
+          <a:xfrm>
+            <a:off x="1606609" y="1153682"/>
+            <a:ext cx="1717971" cy="923330"/>
+          </a:xfrm>
+          <a:prstGeom prst="rect">
+            <a:avLst/>
+          </a:prstGeom>
+          <a:noFill/>
+        </p:spPr>
+        <p:txBody>
+          <a:bodyPr wrap="none" rtlCol="0">
+            <a:spAutoFit/>
+          </a:bodyPr>
+          <a:lstStyle/>
+          <a:p>
+            <a:r>
+              <a:rPr lang="en-US" dirty="0"/>
+              <a:t>Previous version</a:t>
+            </a:r>
+          </a:p>
+          <a:p>
+            <a:r>
+              <a:rPr lang="en-US" dirty="0"/>
+              <a:t>and</a:t>
+            </a:r>
+          </a:p>
+          <a:p>
+            <a:r>
+              <a:rPr lang="en-US" dirty="0"/>
+              <a:t>unused figures</a:t>
+            </a:r>
+          </a:p>
+        </p:txBody>
+      </p:sp>
+    </p:spTree>
+    <p:extLst>
+      <p:ext uri="{BB962C8B-B14F-4D97-AF65-F5344CB8AC3E}">
+        <p14:creationId xmlns:p14="http://schemas.microsoft.com/office/powerpoint/2010/main" val="1391959622"/>
+      </p:ext>
+    </p:extLst>
+  </p:cSld>
+  <p:clrMapOvr>
+    <a:masterClrMapping/>
+  </p:clrMapOvr>
+</p:sld>
+</file>
+
+<file path=ppt/slides/slide4.xml><?xml version="1.0" encoding="utf-8"?>
+<p:sld xmlns:a="http://schemas.openxmlformats.org/drawingml/2006/main" xmlns:r="http://schemas.openxmlformats.org/officeDocument/2006/relationships" xmlns:p="http://schemas.openxmlformats.org/presentationml/2006/main">
+  <p:cSld>
+    <p:spTree>
+      <p:nvGrpSpPr>
+        <p:cNvPr id="1" name=""/>
+        <p:cNvGrpSpPr/>
+        <p:nvPr/>
+      </p:nvGrpSpPr>
+      <p:grpSpPr>
+        <a:xfrm>
+          <a:off x="0" y="0"/>
+          <a:ext cx="0" cy="0"/>
+          <a:chOff x="0" y="0"/>
+          <a:chExt cx="0" cy="0"/>
+        </a:xfrm>
+      </p:grpSpPr>
       <p:cxnSp>
         <p:nvCxnSpPr>
           <p:cNvPr id="5" name="Straight Connector 4"/>
@@ -6455,6 +5961,2114 @@
     <p:extLst>
       <p:ext uri="{BB962C8B-B14F-4D97-AF65-F5344CB8AC3E}">
         <p14:creationId xmlns:p14="http://schemas.microsoft.com/office/powerpoint/2010/main" val="960147129"/>
+      </p:ext>
+    </p:extLst>
+  </p:cSld>
+  <p:clrMapOvr>
+    <a:masterClrMapping/>
+  </p:clrMapOvr>
+</p:sld>
+</file>
+
+<file path=ppt/slides/slide5.xml><?xml version="1.0" encoding="utf-8"?>
+<p:sld xmlns:a="http://schemas.openxmlformats.org/drawingml/2006/main" xmlns:r="http://schemas.openxmlformats.org/officeDocument/2006/relationships" xmlns:p="http://schemas.openxmlformats.org/presentationml/2006/main">
+  <p:cSld>
+    <p:spTree>
+      <p:nvGrpSpPr>
+        <p:cNvPr id="1" name=""/>
+        <p:cNvGrpSpPr/>
+        <p:nvPr/>
+      </p:nvGrpSpPr>
+      <p:grpSpPr>
+        <a:xfrm>
+          <a:off x="0" y="0"/>
+          <a:ext cx="0" cy="0"/>
+          <a:chOff x="0" y="0"/>
+          <a:chExt cx="0" cy="0"/>
+        </a:xfrm>
+      </p:grpSpPr>
+      <p:cxnSp>
+        <p:nvCxnSpPr>
+          <p:cNvPr id="5" name="Straight Connector 4"/>
+          <p:cNvCxnSpPr/>
+          <p:nvPr/>
+        </p:nvCxnSpPr>
+        <p:spPr>
+          <a:xfrm flipV="1">
+            <a:off x="1039572" y="1626508"/>
+            <a:ext cx="10723801" cy="30865"/>
+          </a:xfrm>
+          <a:prstGeom prst="line">
+            <a:avLst/>
+          </a:prstGeom>
+          <a:ln w="38100"/>
+        </p:spPr>
+        <p:style>
+          <a:lnRef idx="1">
+            <a:schemeClr val="accent1"/>
+          </a:lnRef>
+          <a:fillRef idx="0">
+            <a:schemeClr val="accent1"/>
+          </a:fillRef>
+          <a:effectRef idx="0">
+            <a:schemeClr val="accent1"/>
+          </a:effectRef>
+          <a:fontRef idx="minor">
+            <a:schemeClr val="tx1"/>
+          </a:fontRef>
+        </p:style>
+      </p:cxnSp>
+      <p:cxnSp>
+        <p:nvCxnSpPr>
+          <p:cNvPr id="6" name="Straight Connector 5"/>
+          <p:cNvCxnSpPr/>
+          <p:nvPr/>
+        </p:nvCxnSpPr>
+        <p:spPr>
+          <a:xfrm flipV="1">
+            <a:off x="1039573" y="3817488"/>
+            <a:ext cx="10723801" cy="12490"/>
+          </a:xfrm>
+          <a:prstGeom prst="line">
+            <a:avLst/>
+          </a:prstGeom>
+          <a:ln w="38100"/>
+        </p:spPr>
+        <p:style>
+          <a:lnRef idx="1">
+            <a:schemeClr val="accent1"/>
+          </a:lnRef>
+          <a:fillRef idx="0">
+            <a:schemeClr val="accent1"/>
+          </a:fillRef>
+          <a:effectRef idx="0">
+            <a:schemeClr val="accent1"/>
+          </a:effectRef>
+          <a:fontRef idx="minor">
+            <a:schemeClr val="tx1"/>
+          </a:fontRef>
+        </p:style>
+      </p:cxnSp>
+      <p:sp>
+        <p:nvSpPr>
+          <p:cNvPr id="7" name="TextBox 6"/>
+          <p:cNvSpPr txBox="1"/>
+          <p:nvPr/>
+        </p:nvSpPr>
+        <p:spPr>
+          <a:xfrm>
+            <a:off x="65990" y="4087209"/>
+            <a:ext cx="1990726" cy="369332"/>
+          </a:xfrm>
+          <a:prstGeom prst="rect">
+            <a:avLst/>
+          </a:prstGeom>
+          <a:noFill/>
+        </p:spPr>
+        <p:txBody>
+          <a:bodyPr wrap="square" rtlCol="0">
+            <a:spAutoFit/>
+          </a:bodyPr>
+          <a:lstStyle/>
+          <a:p>
+            <a:r>
+              <a:rPr lang="en-US" dirty="0"/>
+              <a:t>Treated Plan</a:t>
+            </a:r>
+          </a:p>
+        </p:txBody>
+      </p:sp>
+      <p:sp>
+        <p:nvSpPr>
+          <p:cNvPr id="8" name="TextBox 7"/>
+          <p:cNvSpPr txBox="1"/>
+          <p:nvPr/>
+        </p:nvSpPr>
+        <p:spPr>
+          <a:xfrm>
+            <a:off x="9524" y="1763493"/>
+            <a:ext cx="2276475" cy="369332"/>
+          </a:xfrm>
+          <a:prstGeom prst="rect">
+            <a:avLst/>
+          </a:prstGeom>
+          <a:noFill/>
+        </p:spPr>
+        <p:txBody>
+          <a:bodyPr wrap="square" rtlCol="0">
+            <a:spAutoFit/>
+          </a:bodyPr>
+          <a:lstStyle/>
+          <a:p>
+            <a:r>
+              <a:rPr lang="en-US" dirty="0"/>
+              <a:t>Treated Phase</a:t>
+            </a:r>
+          </a:p>
+        </p:txBody>
+      </p:sp>
+      <p:sp>
+        <p:nvSpPr>
+          <p:cNvPr id="9" name="TextBox 8"/>
+          <p:cNvSpPr txBox="1"/>
+          <p:nvPr/>
+        </p:nvSpPr>
+        <p:spPr>
+          <a:xfrm>
+            <a:off x="0" y="68413"/>
+            <a:ext cx="1778436" cy="369332"/>
+          </a:xfrm>
+          <a:prstGeom prst="rect">
+            <a:avLst/>
+          </a:prstGeom>
+          <a:noFill/>
+        </p:spPr>
+        <p:txBody>
+          <a:bodyPr wrap="none" rtlCol="0">
+            <a:spAutoFit/>
+          </a:bodyPr>
+          <a:lstStyle/>
+          <a:p>
+            <a:r>
+              <a:rPr lang="en-US" dirty="0"/>
+              <a:t>Course Summary</a:t>
+            </a:r>
+          </a:p>
+        </p:txBody>
+      </p:sp>
+      <p:sp>
+        <p:nvSpPr>
+          <p:cNvPr id="12" name="Rectangle 11"/>
+          <p:cNvSpPr/>
+          <p:nvPr/>
+        </p:nvSpPr>
+        <p:spPr>
+          <a:xfrm>
+            <a:off x="1951255" y="4063877"/>
+            <a:ext cx="2220695" cy="765981"/>
+          </a:xfrm>
+          <a:prstGeom prst="rect">
+            <a:avLst/>
+          </a:prstGeom>
+          <a:solidFill>
+            <a:schemeClr val="accent2">
+              <a:lumMod val="75000"/>
+            </a:schemeClr>
+          </a:solidFill>
+        </p:spPr>
+        <p:style>
+          <a:lnRef idx="2">
+            <a:schemeClr val="accent1">
+              <a:shade val="50000"/>
+            </a:schemeClr>
+          </a:lnRef>
+          <a:fillRef idx="1">
+            <a:schemeClr val="accent1"/>
+          </a:fillRef>
+          <a:effectRef idx="0">
+            <a:schemeClr val="accent1"/>
+          </a:effectRef>
+          <a:fontRef idx="minor">
+            <a:schemeClr val="lt1"/>
+          </a:fontRef>
+        </p:style>
+        <p:txBody>
+          <a:bodyPr rtlCol="0" anchor="ctr"/>
+          <a:lstStyle/>
+          <a:p>
+            <a:pPr algn="ctr"/>
+            <a:r>
+              <a:rPr lang="en-US" sz="1600" dirty="0" err="1"/>
+              <a:t>Breast_L_Tang</a:t>
+            </a:r>
+            <a:endParaRPr lang="en-US" sz="1600" dirty="0"/>
+          </a:p>
+          <a:p>
+            <a:pPr algn="ctr"/>
+            <a:r>
+              <a:rPr lang="en-US" sz="1100" i="1" dirty="0"/>
+              <a:t>(3 delivered of 16 planned)</a:t>
+            </a:r>
+          </a:p>
+        </p:txBody>
+      </p:sp>
+      <p:sp>
+        <p:nvSpPr>
+          <p:cNvPr id="18" name="Rectangle 17"/>
+          <p:cNvSpPr/>
+          <p:nvPr/>
+        </p:nvSpPr>
+        <p:spPr>
+          <a:xfrm>
+            <a:off x="4499193" y="4071345"/>
+            <a:ext cx="2525494" cy="756588"/>
+          </a:xfrm>
+          <a:prstGeom prst="rect">
+            <a:avLst/>
+          </a:prstGeom>
+          <a:solidFill>
+            <a:schemeClr val="accent6">
+              <a:lumMod val="75000"/>
+            </a:schemeClr>
+          </a:solidFill>
+        </p:spPr>
+        <p:style>
+          <a:lnRef idx="2">
+            <a:schemeClr val="accent1">
+              <a:shade val="50000"/>
+            </a:schemeClr>
+          </a:lnRef>
+          <a:fillRef idx="1">
+            <a:schemeClr val="accent1"/>
+          </a:fillRef>
+          <a:effectRef idx="0">
+            <a:schemeClr val="accent1"/>
+          </a:effectRef>
+          <a:fontRef idx="minor">
+            <a:schemeClr val="lt1"/>
+          </a:fontRef>
+        </p:style>
+        <p:txBody>
+          <a:bodyPr rtlCol="0" anchor="ctr"/>
+          <a:lstStyle/>
+          <a:p>
+            <a:pPr algn="ctr"/>
+            <a:r>
+              <a:rPr lang="en-US" sz="1600" dirty="0"/>
+              <a:t>Breast_L_Tang:1</a:t>
+            </a:r>
+          </a:p>
+          <a:p>
+            <a:pPr algn="ctr"/>
+            <a:r>
+              <a:rPr lang="en-US" sz="1100" dirty="0"/>
+              <a:t>Adaptation</a:t>
+            </a:r>
+          </a:p>
+          <a:p>
+            <a:pPr algn="ctr"/>
+            <a:r>
+              <a:rPr lang="en-US" sz="1100" dirty="0"/>
+              <a:t>(13 fractions delivered of 13 planned)</a:t>
+            </a:r>
+          </a:p>
+        </p:txBody>
+      </p:sp>
+      <p:sp>
+        <p:nvSpPr>
+          <p:cNvPr id="19" name="Rectangle 18"/>
+          <p:cNvSpPr/>
+          <p:nvPr/>
+        </p:nvSpPr>
+        <p:spPr>
+          <a:xfrm>
+            <a:off x="7164792" y="4065495"/>
+            <a:ext cx="2220695" cy="765981"/>
+          </a:xfrm>
+          <a:prstGeom prst="rect">
+            <a:avLst/>
+          </a:prstGeom>
+          <a:solidFill>
+            <a:srgbClr val="00B0F0"/>
+          </a:solidFill>
+        </p:spPr>
+        <p:style>
+          <a:lnRef idx="2">
+            <a:schemeClr val="accent1">
+              <a:shade val="50000"/>
+            </a:schemeClr>
+          </a:lnRef>
+          <a:fillRef idx="1">
+            <a:schemeClr val="accent1"/>
+          </a:fillRef>
+          <a:effectRef idx="0">
+            <a:schemeClr val="accent1"/>
+          </a:effectRef>
+          <a:fontRef idx="minor">
+            <a:schemeClr val="lt1"/>
+          </a:fontRef>
+        </p:style>
+        <p:txBody>
+          <a:bodyPr rtlCol="0" anchor="ctr"/>
+          <a:lstStyle/>
+          <a:p>
+            <a:pPr algn="ctr"/>
+            <a:r>
+              <a:rPr lang="en-US" sz="1600" dirty="0" err="1"/>
+              <a:t>Breast_L_Boost</a:t>
+            </a:r>
+            <a:endParaRPr lang="en-US" sz="1600" dirty="0"/>
+          </a:p>
+          <a:p>
+            <a:pPr algn="ctr"/>
+            <a:r>
+              <a:rPr lang="en-US" sz="1100" i="1" dirty="0"/>
+              <a:t>(4 fractions delivered of 4 planned)</a:t>
+            </a:r>
+          </a:p>
+        </p:txBody>
+      </p:sp>
+      <p:sp>
+        <p:nvSpPr>
+          <p:cNvPr id="20" name="Rectangle 19"/>
+          <p:cNvSpPr/>
+          <p:nvPr/>
+        </p:nvSpPr>
+        <p:spPr>
+          <a:xfrm>
+            <a:off x="9572625" y="4052512"/>
+            <a:ext cx="2413727" cy="775421"/>
+          </a:xfrm>
+          <a:prstGeom prst="rect">
+            <a:avLst/>
+          </a:prstGeom>
+          <a:solidFill>
+            <a:srgbClr val="C00000"/>
+          </a:solidFill>
+        </p:spPr>
+        <p:style>
+          <a:lnRef idx="2">
+            <a:schemeClr val="accent1">
+              <a:shade val="50000"/>
+            </a:schemeClr>
+          </a:lnRef>
+          <a:fillRef idx="1">
+            <a:schemeClr val="accent1"/>
+          </a:fillRef>
+          <a:effectRef idx="0">
+            <a:schemeClr val="accent1"/>
+          </a:effectRef>
+          <a:fontRef idx="minor">
+            <a:schemeClr val="lt1"/>
+          </a:fontRef>
+        </p:style>
+        <p:txBody>
+          <a:bodyPr rtlCol="0" anchor="ctr"/>
+          <a:lstStyle/>
+          <a:p>
+            <a:pPr algn="ctr"/>
+            <a:r>
+              <a:rPr lang="en-US" sz="1600" dirty="0" err="1"/>
+              <a:t>Breast_R_Tang</a:t>
+            </a:r>
+            <a:endParaRPr lang="en-US" sz="1600" dirty="0"/>
+          </a:p>
+          <a:p>
+            <a:pPr algn="ctr"/>
+            <a:r>
+              <a:rPr lang="en-US" sz="1100" i="1" dirty="0"/>
+              <a:t>(16 fractions delivered of 16 planned )</a:t>
+            </a:r>
+          </a:p>
+        </p:txBody>
+      </p:sp>
+      <p:sp>
+        <p:nvSpPr>
+          <p:cNvPr id="56" name="Rectangle 55"/>
+          <p:cNvSpPr/>
+          <p:nvPr/>
+        </p:nvSpPr>
+        <p:spPr>
+          <a:xfrm>
+            <a:off x="2056716" y="1879849"/>
+            <a:ext cx="3545458" cy="1582882"/>
+          </a:xfrm>
+          <a:prstGeom prst="rect">
+            <a:avLst/>
+          </a:prstGeom>
+          <a:solidFill>
+            <a:srgbClr val="002060"/>
+          </a:solidFill>
+        </p:spPr>
+        <p:style>
+          <a:lnRef idx="2">
+            <a:schemeClr val="accent1">
+              <a:shade val="50000"/>
+            </a:schemeClr>
+          </a:lnRef>
+          <a:fillRef idx="1">
+            <a:schemeClr val="accent1"/>
+          </a:fillRef>
+          <a:effectRef idx="0">
+            <a:schemeClr val="accent1"/>
+          </a:effectRef>
+          <a:fontRef idx="minor">
+            <a:schemeClr val="lt1"/>
+          </a:fontRef>
+        </p:style>
+        <p:txBody>
+          <a:bodyPr rtlCol="0" anchor="ctr"/>
+          <a:lstStyle/>
+          <a:p>
+            <a:r>
+              <a:rPr lang="en-US" sz="1600" dirty="0"/>
+              <a:t>Phase Name: Left Breast Tangents</a:t>
+            </a:r>
+          </a:p>
+          <a:p>
+            <a:r>
+              <a:rPr lang="en-US" sz="1400" dirty="0"/>
+              <a:t>Target Volumes</a:t>
+            </a:r>
+          </a:p>
+          <a:p>
+            <a:pPr marL="285750" indent="-115888">
+              <a:buFont typeface="Arial" panose="020B0604020202020204" pitchFamily="34" charset="0"/>
+              <a:buChar char="•"/>
+            </a:pPr>
+            <a:r>
+              <a:rPr lang="en-US" sz="1400" dirty="0"/>
+              <a:t>Left Breast : 4256 </a:t>
+            </a:r>
+            <a:r>
+              <a:rPr lang="en-US" sz="1400" dirty="0" err="1"/>
+              <a:t>cGy</a:t>
+            </a:r>
+            <a:endParaRPr lang="en-US" sz="1400" dirty="0"/>
+          </a:p>
+          <a:p>
+            <a:pPr marL="285750" indent="-115888">
+              <a:buFont typeface="Arial" panose="020B0604020202020204" pitchFamily="34" charset="0"/>
+              <a:buChar char="•"/>
+            </a:pPr>
+            <a:r>
+              <a:rPr lang="en-US" sz="1400" dirty="0"/>
+              <a:t>Left Breast Surgical Bed : 4256 </a:t>
+            </a:r>
+            <a:r>
+              <a:rPr lang="en-US" sz="1400" dirty="0" err="1"/>
+              <a:t>cGy</a:t>
+            </a:r>
+            <a:endParaRPr lang="en-US" sz="1400" dirty="0"/>
+          </a:p>
+          <a:p>
+            <a:pPr marL="285750" indent="-115888">
+              <a:buFont typeface="Arial" panose="020B0604020202020204" pitchFamily="34" charset="0"/>
+              <a:buChar char="•"/>
+            </a:pPr>
+            <a:r>
+              <a:rPr lang="en-US" sz="1400" dirty="0"/>
+              <a:t>Left Axillary Nodes, SC and IMN: 4256 </a:t>
+            </a:r>
+            <a:r>
+              <a:rPr lang="en-US" sz="1400" dirty="0" err="1"/>
+              <a:t>cGy</a:t>
+            </a:r>
+            <a:endParaRPr lang="en-US" sz="1400" dirty="0"/>
+          </a:p>
+          <a:p>
+            <a:r>
+              <a:rPr lang="en-US" sz="1400" dirty="0"/>
+              <a:t>Treated in 16 phase fractions</a:t>
+            </a:r>
+          </a:p>
+          <a:p>
+            <a:r>
+              <a:rPr lang="en-US" sz="1400" dirty="0"/>
+              <a:t>Using Photons 3D</a:t>
+            </a:r>
+          </a:p>
+        </p:txBody>
+      </p:sp>
+      <p:cxnSp>
+        <p:nvCxnSpPr>
+          <p:cNvPr id="58" name="Straight Arrow Connector 57"/>
+          <p:cNvCxnSpPr>
+            <a:cxnSpLocks/>
+          </p:cNvCxnSpPr>
+          <p:nvPr/>
+        </p:nvCxnSpPr>
+        <p:spPr>
+          <a:xfrm flipV="1">
+            <a:off x="2689887" y="3490740"/>
+            <a:ext cx="339170" cy="521554"/>
+          </a:xfrm>
+          <a:prstGeom prst="straightConnector1">
+            <a:avLst/>
+          </a:prstGeom>
+          <a:ln w="50800">
+            <a:solidFill>
+              <a:schemeClr val="tx1"/>
+            </a:solidFill>
+            <a:tailEnd type="triangle"/>
+          </a:ln>
+        </p:spPr>
+        <p:style>
+          <a:lnRef idx="1">
+            <a:schemeClr val="accent1"/>
+          </a:lnRef>
+          <a:fillRef idx="0">
+            <a:schemeClr val="accent1"/>
+          </a:fillRef>
+          <a:effectRef idx="0">
+            <a:schemeClr val="accent1"/>
+          </a:effectRef>
+          <a:fontRef idx="minor">
+            <a:schemeClr val="tx1"/>
+          </a:fontRef>
+        </p:style>
+      </p:cxnSp>
+      <p:cxnSp>
+        <p:nvCxnSpPr>
+          <p:cNvPr id="60" name="Straight Arrow Connector 59"/>
+          <p:cNvCxnSpPr>
+            <a:cxnSpLocks/>
+          </p:cNvCxnSpPr>
+          <p:nvPr/>
+        </p:nvCxnSpPr>
+        <p:spPr>
+          <a:xfrm flipH="1" flipV="1">
+            <a:off x="4794524" y="3516008"/>
+            <a:ext cx="383088" cy="506751"/>
+          </a:xfrm>
+          <a:prstGeom prst="straightConnector1">
+            <a:avLst/>
+          </a:prstGeom>
+          <a:ln w="50800">
+            <a:solidFill>
+              <a:schemeClr val="tx1"/>
+            </a:solidFill>
+            <a:tailEnd type="triangle"/>
+          </a:ln>
+        </p:spPr>
+        <p:style>
+          <a:lnRef idx="1">
+            <a:schemeClr val="accent1"/>
+          </a:lnRef>
+          <a:fillRef idx="0">
+            <a:schemeClr val="accent1"/>
+          </a:fillRef>
+          <a:effectRef idx="0">
+            <a:schemeClr val="accent1"/>
+          </a:effectRef>
+          <a:fontRef idx="minor">
+            <a:schemeClr val="tx1"/>
+          </a:fontRef>
+        </p:style>
+      </p:cxnSp>
+      <p:sp>
+        <p:nvSpPr>
+          <p:cNvPr id="61" name="Rectangle 60"/>
+          <p:cNvSpPr/>
+          <p:nvPr/>
+        </p:nvSpPr>
+        <p:spPr>
+          <a:xfrm>
+            <a:off x="5712053" y="1878868"/>
+            <a:ext cx="3006270" cy="1327141"/>
+          </a:xfrm>
+          <a:prstGeom prst="rect">
+            <a:avLst/>
+          </a:prstGeom>
+          <a:solidFill>
+            <a:srgbClr val="002060"/>
+          </a:solidFill>
+        </p:spPr>
+        <p:style>
+          <a:lnRef idx="2">
+            <a:schemeClr val="accent1">
+              <a:shade val="50000"/>
+            </a:schemeClr>
+          </a:lnRef>
+          <a:fillRef idx="1">
+            <a:schemeClr val="accent1"/>
+          </a:fillRef>
+          <a:effectRef idx="0">
+            <a:schemeClr val="accent1"/>
+          </a:effectRef>
+          <a:fontRef idx="minor">
+            <a:schemeClr val="lt1"/>
+          </a:fontRef>
+        </p:style>
+        <p:txBody>
+          <a:bodyPr rtlCol="0" anchor="ctr"/>
+          <a:lstStyle/>
+          <a:p>
+            <a:r>
+              <a:rPr lang="en-US" sz="1600" dirty="0"/>
+              <a:t>Phase Name: Left Breast Boost</a:t>
+            </a:r>
+          </a:p>
+          <a:p>
+            <a:r>
+              <a:rPr lang="en-US" sz="1400" dirty="0"/>
+              <a:t>Target Volumes</a:t>
+            </a:r>
+          </a:p>
+          <a:p>
+            <a:pPr marL="285750" indent="-115888">
+              <a:buFont typeface="Arial" panose="020B0604020202020204" pitchFamily="34" charset="0"/>
+              <a:buChar char="•"/>
+            </a:pPr>
+            <a:r>
+              <a:rPr lang="en-US" sz="1400" dirty="0"/>
+              <a:t>Left Breast Surgical Bed: 1000 </a:t>
+            </a:r>
+            <a:r>
+              <a:rPr lang="en-US" sz="1400" dirty="0" err="1"/>
+              <a:t>cGy</a:t>
+            </a:r>
+            <a:endParaRPr lang="en-US" sz="1400" dirty="0"/>
+          </a:p>
+          <a:p>
+            <a:r>
+              <a:rPr lang="en-US" sz="1400" dirty="0"/>
+              <a:t>Treated in 4 phase fractions</a:t>
+            </a:r>
+          </a:p>
+          <a:p>
+            <a:r>
+              <a:rPr lang="en-US" sz="1400" dirty="0"/>
+              <a:t>Using Electrons 3D</a:t>
+            </a:r>
+          </a:p>
+        </p:txBody>
+      </p:sp>
+      <p:sp>
+        <p:nvSpPr>
+          <p:cNvPr id="62" name="Rectangle 61"/>
+          <p:cNvSpPr/>
+          <p:nvPr/>
+        </p:nvSpPr>
+        <p:spPr>
+          <a:xfrm>
+            <a:off x="8828202" y="1878868"/>
+            <a:ext cx="3006270" cy="1342342"/>
+          </a:xfrm>
+          <a:prstGeom prst="rect">
+            <a:avLst/>
+          </a:prstGeom>
+          <a:solidFill>
+            <a:srgbClr val="002060"/>
+          </a:solidFill>
+        </p:spPr>
+        <p:style>
+          <a:lnRef idx="2">
+            <a:schemeClr val="accent1">
+              <a:shade val="50000"/>
+            </a:schemeClr>
+          </a:lnRef>
+          <a:fillRef idx="1">
+            <a:schemeClr val="accent1"/>
+          </a:fillRef>
+          <a:effectRef idx="0">
+            <a:schemeClr val="accent1"/>
+          </a:effectRef>
+          <a:fontRef idx="minor">
+            <a:schemeClr val="lt1"/>
+          </a:fontRef>
+        </p:style>
+        <p:txBody>
+          <a:bodyPr rtlCol="0" anchor="ctr"/>
+          <a:lstStyle/>
+          <a:p>
+            <a:r>
+              <a:rPr lang="en-US" sz="1600" dirty="0"/>
+              <a:t>Phase Name: Right Breast Tangents</a:t>
+            </a:r>
+          </a:p>
+          <a:p>
+            <a:r>
+              <a:rPr lang="en-US" sz="1400" dirty="0"/>
+              <a:t>Target Volumes </a:t>
+            </a:r>
+          </a:p>
+          <a:p>
+            <a:pPr marL="285750" indent="-115888">
+              <a:buFont typeface="Arial" panose="020B0604020202020204" pitchFamily="34" charset="0"/>
+              <a:buChar char="•"/>
+            </a:pPr>
+            <a:r>
+              <a:rPr lang="en-US" sz="1400" dirty="0"/>
+              <a:t>Right Breast : 4256 </a:t>
+            </a:r>
+            <a:r>
+              <a:rPr lang="en-US" sz="1400" dirty="0" err="1"/>
+              <a:t>cGy</a:t>
+            </a:r>
+            <a:endParaRPr lang="en-US" sz="1400" dirty="0"/>
+          </a:p>
+          <a:p>
+            <a:r>
+              <a:rPr lang="en-US" sz="1400" dirty="0"/>
+              <a:t>Treated in 16 phase fractions</a:t>
+            </a:r>
+          </a:p>
+          <a:p>
+            <a:r>
+              <a:rPr lang="en-US" sz="1400" dirty="0"/>
+              <a:t>Using Photons 3D</a:t>
+            </a:r>
+          </a:p>
+        </p:txBody>
+      </p:sp>
+      <p:cxnSp>
+        <p:nvCxnSpPr>
+          <p:cNvPr id="63" name="Straight Arrow Connector 62"/>
+          <p:cNvCxnSpPr>
+            <a:cxnSpLocks/>
+          </p:cNvCxnSpPr>
+          <p:nvPr/>
+        </p:nvCxnSpPr>
+        <p:spPr>
+          <a:xfrm flipV="1">
+            <a:off x="7839790" y="3259237"/>
+            <a:ext cx="0" cy="753057"/>
+          </a:xfrm>
+          <a:prstGeom prst="straightConnector1">
+            <a:avLst/>
+          </a:prstGeom>
+          <a:ln w="50800">
+            <a:solidFill>
+              <a:schemeClr val="tx1"/>
+            </a:solidFill>
+            <a:tailEnd type="triangle"/>
+          </a:ln>
+        </p:spPr>
+        <p:style>
+          <a:lnRef idx="1">
+            <a:schemeClr val="accent1"/>
+          </a:lnRef>
+          <a:fillRef idx="0">
+            <a:schemeClr val="accent1"/>
+          </a:fillRef>
+          <a:effectRef idx="0">
+            <a:schemeClr val="accent1"/>
+          </a:effectRef>
+          <a:fontRef idx="minor">
+            <a:schemeClr val="tx1"/>
+          </a:fontRef>
+        </p:style>
+      </p:cxnSp>
+      <p:cxnSp>
+        <p:nvCxnSpPr>
+          <p:cNvPr id="65" name="Straight Arrow Connector 64"/>
+          <p:cNvCxnSpPr>
+            <a:cxnSpLocks/>
+          </p:cNvCxnSpPr>
+          <p:nvPr/>
+        </p:nvCxnSpPr>
+        <p:spPr>
+          <a:xfrm flipV="1">
+            <a:off x="10540380" y="3259237"/>
+            <a:ext cx="0" cy="770562"/>
+          </a:xfrm>
+          <a:prstGeom prst="straightConnector1">
+            <a:avLst/>
+          </a:prstGeom>
+          <a:ln w="50800">
+            <a:solidFill>
+              <a:schemeClr val="tx1"/>
+            </a:solidFill>
+            <a:tailEnd type="triangle"/>
+          </a:ln>
+        </p:spPr>
+        <p:style>
+          <a:lnRef idx="1">
+            <a:schemeClr val="accent1"/>
+          </a:lnRef>
+          <a:fillRef idx="0">
+            <a:schemeClr val="accent1"/>
+          </a:fillRef>
+          <a:effectRef idx="0">
+            <a:schemeClr val="accent1"/>
+          </a:effectRef>
+          <a:fontRef idx="minor">
+            <a:schemeClr val="tx1"/>
+          </a:fontRef>
+        </p:style>
+      </p:cxnSp>
+      <p:sp>
+        <p:nvSpPr>
+          <p:cNvPr id="66" name="Rectangle 65"/>
+          <p:cNvSpPr/>
+          <p:nvPr/>
+        </p:nvSpPr>
+        <p:spPr>
+          <a:xfrm>
+            <a:off x="3887650" y="39840"/>
+            <a:ext cx="5497837" cy="1322886"/>
+          </a:xfrm>
+          <a:prstGeom prst="rect">
+            <a:avLst/>
+          </a:prstGeom>
+          <a:solidFill>
+            <a:schemeClr val="accent4">
+              <a:lumMod val="75000"/>
+            </a:schemeClr>
+          </a:solidFill>
+        </p:spPr>
+        <p:style>
+          <a:lnRef idx="2">
+            <a:schemeClr val="accent1">
+              <a:shade val="50000"/>
+            </a:schemeClr>
+          </a:lnRef>
+          <a:fillRef idx="1">
+            <a:schemeClr val="accent1"/>
+          </a:fillRef>
+          <a:effectRef idx="0">
+            <a:schemeClr val="accent1"/>
+          </a:effectRef>
+          <a:fontRef idx="minor">
+            <a:schemeClr val="lt1"/>
+          </a:fontRef>
+        </p:style>
+        <p:txBody>
+          <a:bodyPr rtlCol="0" anchor="ctr"/>
+          <a:lstStyle/>
+          <a:p>
+            <a:r>
+              <a:rPr lang="en-US" sz="1600" dirty="0"/>
+              <a:t>Left Breast : 4256 </a:t>
+            </a:r>
+            <a:r>
+              <a:rPr lang="en-US" sz="1600" dirty="0" err="1"/>
+              <a:t>cGy</a:t>
+            </a:r>
+            <a:r>
+              <a:rPr lang="en-US" sz="1600" dirty="0"/>
+              <a:t> in 16 sessions</a:t>
+            </a:r>
+          </a:p>
+          <a:p>
+            <a:r>
+              <a:rPr lang="en-US" sz="1600" dirty="0"/>
+              <a:t>Left Axillary Nodes, SC and IMN:  4256 </a:t>
+            </a:r>
+            <a:r>
+              <a:rPr lang="en-US" sz="1600" dirty="0" err="1"/>
+              <a:t>cGy</a:t>
+            </a:r>
+            <a:r>
+              <a:rPr lang="en-US" sz="1600" dirty="0"/>
+              <a:t> in 16 sessions</a:t>
+            </a:r>
+          </a:p>
+          <a:p>
+            <a:r>
+              <a:rPr lang="en-US" sz="1600" dirty="0"/>
+              <a:t>Left Breast Surgical Bed: 5256 </a:t>
+            </a:r>
+            <a:r>
+              <a:rPr lang="en-US" sz="1600" dirty="0" err="1"/>
+              <a:t>cGy</a:t>
+            </a:r>
+            <a:r>
+              <a:rPr lang="en-US" sz="1600" dirty="0"/>
+              <a:t> in 20 sessions</a:t>
+            </a:r>
+          </a:p>
+          <a:p>
+            <a:r>
+              <a:rPr lang="en-US" sz="1600" dirty="0"/>
+              <a:t>Right Breast: 4256  </a:t>
+            </a:r>
+            <a:r>
+              <a:rPr lang="en-US" sz="1600" dirty="0" err="1"/>
+              <a:t>cGy</a:t>
+            </a:r>
+            <a:r>
+              <a:rPr lang="en-US" sz="1600" dirty="0"/>
+              <a:t> in 16 sessions</a:t>
+            </a:r>
+          </a:p>
+          <a:p>
+            <a:r>
+              <a:rPr lang="en-US" sz="1600" dirty="0"/>
+              <a:t>All treated in 20 sessions over 26 days</a:t>
+            </a:r>
+          </a:p>
+        </p:txBody>
+      </p:sp>
+      <p:cxnSp>
+        <p:nvCxnSpPr>
+          <p:cNvPr id="69" name="Straight Arrow Connector 68"/>
+          <p:cNvCxnSpPr/>
+          <p:nvPr/>
+        </p:nvCxnSpPr>
+        <p:spPr>
+          <a:xfrm flipV="1">
+            <a:off x="4171950" y="1428765"/>
+            <a:ext cx="300307" cy="364881"/>
+          </a:xfrm>
+          <a:prstGeom prst="straightConnector1">
+            <a:avLst/>
+          </a:prstGeom>
+          <a:ln w="50800">
+            <a:solidFill>
+              <a:schemeClr val="tx1"/>
+            </a:solidFill>
+            <a:tailEnd type="triangle"/>
+          </a:ln>
+        </p:spPr>
+        <p:style>
+          <a:lnRef idx="1">
+            <a:schemeClr val="accent1"/>
+          </a:lnRef>
+          <a:fillRef idx="0">
+            <a:schemeClr val="accent1"/>
+          </a:fillRef>
+          <a:effectRef idx="0">
+            <a:schemeClr val="accent1"/>
+          </a:effectRef>
+          <a:fontRef idx="minor">
+            <a:schemeClr val="tx1"/>
+          </a:fontRef>
+        </p:style>
+      </p:cxnSp>
+      <p:cxnSp>
+        <p:nvCxnSpPr>
+          <p:cNvPr id="71" name="Straight Arrow Connector 70"/>
+          <p:cNvCxnSpPr>
+            <a:cxnSpLocks/>
+          </p:cNvCxnSpPr>
+          <p:nvPr/>
+        </p:nvCxnSpPr>
+        <p:spPr>
+          <a:xfrm flipV="1">
+            <a:off x="6645738" y="1410779"/>
+            <a:ext cx="0" cy="400851"/>
+          </a:xfrm>
+          <a:prstGeom prst="straightConnector1">
+            <a:avLst/>
+          </a:prstGeom>
+          <a:ln w="50800">
+            <a:solidFill>
+              <a:schemeClr val="tx1"/>
+            </a:solidFill>
+            <a:tailEnd type="triangle"/>
+          </a:ln>
+        </p:spPr>
+        <p:style>
+          <a:lnRef idx="1">
+            <a:schemeClr val="accent1"/>
+          </a:lnRef>
+          <a:fillRef idx="0">
+            <a:schemeClr val="accent1"/>
+          </a:fillRef>
+          <a:effectRef idx="0">
+            <a:schemeClr val="accent1"/>
+          </a:effectRef>
+          <a:fontRef idx="minor">
+            <a:schemeClr val="tx1"/>
+          </a:fontRef>
+        </p:style>
+      </p:cxnSp>
+      <p:cxnSp>
+        <p:nvCxnSpPr>
+          <p:cNvPr id="74" name="Straight Arrow Connector 73"/>
+          <p:cNvCxnSpPr>
+            <a:cxnSpLocks/>
+          </p:cNvCxnSpPr>
+          <p:nvPr/>
+        </p:nvCxnSpPr>
+        <p:spPr>
+          <a:xfrm flipH="1" flipV="1">
+            <a:off x="9048296" y="1454790"/>
+            <a:ext cx="312520" cy="333693"/>
+          </a:xfrm>
+          <a:prstGeom prst="straightConnector1">
+            <a:avLst/>
+          </a:prstGeom>
+          <a:ln w="50800">
+            <a:solidFill>
+              <a:schemeClr val="tx1"/>
+            </a:solidFill>
+            <a:tailEnd type="triangle"/>
+          </a:ln>
+        </p:spPr>
+        <p:style>
+          <a:lnRef idx="1">
+            <a:schemeClr val="accent1"/>
+          </a:lnRef>
+          <a:fillRef idx="0">
+            <a:schemeClr val="accent1"/>
+          </a:fillRef>
+          <a:effectRef idx="0">
+            <a:schemeClr val="accent1"/>
+          </a:effectRef>
+          <a:fontRef idx="minor">
+            <a:schemeClr val="tx1"/>
+          </a:fontRef>
+        </p:style>
+      </p:cxnSp>
+      <p:sp>
+        <p:nvSpPr>
+          <p:cNvPr id="25" name="TextBox 24">
+            <a:extLst>
+              <a:ext uri="{FF2B5EF4-FFF2-40B4-BE49-F238E27FC236}">
+                <a16:creationId xmlns:a16="http://schemas.microsoft.com/office/drawing/2014/main" id="{C5F4CFFE-EA91-4B1C-8E80-20516EE9FFCA}"/>
+              </a:ext>
+            </a:extLst>
+          </p:cNvPr>
+          <p:cNvSpPr txBox="1"/>
+          <p:nvPr/>
+        </p:nvSpPr>
+        <p:spPr>
+          <a:xfrm>
+            <a:off x="9714031" y="223285"/>
+            <a:ext cx="2130913" cy="646331"/>
+          </a:xfrm>
+          <a:prstGeom prst="rect">
+            <a:avLst/>
+          </a:prstGeom>
+          <a:noFill/>
+        </p:spPr>
+        <p:txBody>
+          <a:bodyPr wrap="square" rtlCol="0">
+            <a:spAutoFit/>
+          </a:bodyPr>
+          <a:lstStyle/>
+          <a:p>
+            <a:r>
+              <a:rPr lang="en-US" dirty="0"/>
+              <a:t>Bilateral Breast with Plan Adaptation </a:t>
+            </a:r>
+          </a:p>
+        </p:txBody>
+      </p:sp>
+      <p:pic>
+        <p:nvPicPr>
+          <p:cNvPr id="10" name="Picture 9">
+            <a:extLst>
+              <a:ext uri="{FF2B5EF4-FFF2-40B4-BE49-F238E27FC236}">
+                <a16:creationId xmlns:a16="http://schemas.microsoft.com/office/drawing/2014/main" id="{9BFF0BB7-EC6B-4373-846F-C38382520B21}"/>
+              </a:ext>
+            </a:extLst>
+          </p:cNvPr>
+          <p:cNvPicPr>
+            <a:picLocks noChangeAspect="1"/>
+          </p:cNvPicPr>
+          <p:nvPr/>
+        </p:nvPicPr>
+        <p:blipFill>
+          <a:blip r:embed="rId2"/>
+          <a:stretch>
+            <a:fillRect/>
+          </a:stretch>
+        </p:blipFill>
+        <p:spPr>
+          <a:xfrm>
+            <a:off x="2121825" y="4968947"/>
+            <a:ext cx="7948349" cy="1883233"/>
+          </a:xfrm>
+          <a:prstGeom prst="rect">
+            <a:avLst/>
+          </a:prstGeom>
+        </p:spPr>
+      </p:pic>
+    </p:spTree>
+    <p:extLst>
+      <p:ext uri="{BB962C8B-B14F-4D97-AF65-F5344CB8AC3E}">
+        <p14:creationId xmlns:p14="http://schemas.microsoft.com/office/powerpoint/2010/main" val="2925579626"/>
+      </p:ext>
+    </p:extLst>
+  </p:cSld>
+  <p:clrMapOvr>
+    <a:masterClrMapping/>
+  </p:clrMapOvr>
+</p:sld>
+</file>
+
+<file path=ppt/slides/slide6.xml><?xml version="1.0" encoding="utf-8"?>
+<p:sld xmlns:a="http://schemas.openxmlformats.org/drawingml/2006/main" xmlns:r="http://schemas.openxmlformats.org/officeDocument/2006/relationships" xmlns:p="http://schemas.openxmlformats.org/presentationml/2006/main">
+  <p:cSld>
+    <p:spTree>
+      <p:nvGrpSpPr>
+        <p:cNvPr id="1" name=""/>
+        <p:cNvGrpSpPr/>
+        <p:nvPr/>
+      </p:nvGrpSpPr>
+      <p:grpSpPr>
+        <a:xfrm>
+          <a:off x="0" y="0"/>
+          <a:ext cx="0" cy="0"/>
+          <a:chOff x="0" y="0"/>
+          <a:chExt cx="0" cy="0"/>
+        </a:xfrm>
+      </p:grpSpPr>
+      <p:cxnSp>
+        <p:nvCxnSpPr>
+          <p:cNvPr id="5" name="Straight Connector 4"/>
+          <p:cNvCxnSpPr/>
+          <p:nvPr/>
+        </p:nvCxnSpPr>
+        <p:spPr>
+          <a:xfrm flipV="1">
+            <a:off x="1058379" y="1624197"/>
+            <a:ext cx="10723801" cy="30865"/>
+          </a:xfrm>
+          <a:prstGeom prst="line">
+            <a:avLst/>
+          </a:prstGeom>
+          <a:ln w="38100"/>
+        </p:spPr>
+        <p:style>
+          <a:lnRef idx="1">
+            <a:schemeClr val="accent1"/>
+          </a:lnRef>
+          <a:fillRef idx="0">
+            <a:schemeClr val="accent1"/>
+          </a:fillRef>
+          <a:effectRef idx="0">
+            <a:schemeClr val="accent1"/>
+          </a:effectRef>
+          <a:fontRef idx="minor">
+            <a:schemeClr val="tx1"/>
+          </a:fontRef>
+        </p:style>
+      </p:cxnSp>
+      <p:cxnSp>
+        <p:nvCxnSpPr>
+          <p:cNvPr id="6" name="Straight Connector 5"/>
+          <p:cNvCxnSpPr/>
+          <p:nvPr/>
+        </p:nvCxnSpPr>
+        <p:spPr>
+          <a:xfrm flipV="1">
+            <a:off x="1061353" y="3823784"/>
+            <a:ext cx="10723801" cy="12490"/>
+          </a:xfrm>
+          <a:prstGeom prst="line">
+            <a:avLst/>
+          </a:prstGeom>
+          <a:ln w="38100"/>
+        </p:spPr>
+        <p:style>
+          <a:lnRef idx="1">
+            <a:schemeClr val="accent1"/>
+          </a:lnRef>
+          <a:fillRef idx="0">
+            <a:schemeClr val="accent1"/>
+          </a:fillRef>
+          <a:effectRef idx="0">
+            <a:schemeClr val="accent1"/>
+          </a:effectRef>
+          <a:fontRef idx="minor">
+            <a:schemeClr val="tx1"/>
+          </a:fontRef>
+        </p:style>
+      </p:cxnSp>
+      <p:sp>
+        <p:nvSpPr>
+          <p:cNvPr id="7" name="TextBox 6"/>
+          <p:cNvSpPr txBox="1"/>
+          <p:nvPr/>
+        </p:nvSpPr>
+        <p:spPr>
+          <a:xfrm>
+            <a:off x="65990" y="4087209"/>
+            <a:ext cx="1990726" cy="646331"/>
+          </a:xfrm>
+          <a:prstGeom prst="rect">
+            <a:avLst/>
+          </a:prstGeom>
+          <a:noFill/>
+        </p:spPr>
+        <p:txBody>
+          <a:bodyPr wrap="square" rtlCol="0">
+            <a:spAutoFit/>
+          </a:bodyPr>
+          <a:lstStyle/>
+          <a:p>
+            <a:r>
+              <a:rPr lang="en-US" dirty="0"/>
+              <a:t>Delivered Treatment Plan</a:t>
+            </a:r>
+          </a:p>
+        </p:txBody>
+      </p:sp>
+      <p:sp>
+        <p:nvSpPr>
+          <p:cNvPr id="8" name="TextBox 7"/>
+          <p:cNvSpPr txBox="1"/>
+          <p:nvPr/>
+        </p:nvSpPr>
+        <p:spPr>
+          <a:xfrm>
+            <a:off x="0" y="1803796"/>
+            <a:ext cx="2276475" cy="369332"/>
+          </a:xfrm>
+          <a:prstGeom prst="rect">
+            <a:avLst/>
+          </a:prstGeom>
+          <a:noFill/>
+        </p:spPr>
+        <p:txBody>
+          <a:bodyPr wrap="square" rtlCol="0">
+            <a:spAutoFit/>
+          </a:bodyPr>
+          <a:lstStyle/>
+          <a:p>
+            <a:r>
+              <a:rPr lang="en-US" dirty="0"/>
+              <a:t>Phase Summary</a:t>
+            </a:r>
+          </a:p>
+        </p:txBody>
+      </p:sp>
+      <p:sp>
+        <p:nvSpPr>
+          <p:cNvPr id="9" name="TextBox 8"/>
+          <p:cNvSpPr txBox="1"/>
+          <p:nvPr/>
+        </p:nvSpPr>
+        <p:spPr>
+          <a:xfrm>
+            <a:off x="0" y="68413"/>
+            <a:ext cx="1778436" cy="369332"/>
+          </a:xfrm>
+          <a:prstGeom prst="rect">
+            <a:avLst/>
+          </a:prstGeom>
+          <a:noFill/>
+        </p:spPr>
+        <p:txBody>
+          <a:bodyPr wrap="none" rtlCol="0">
+            <a:spAutoFit/>
+          </a:bodyPr>
+          <a:lstStyle/>
+          <a:p>
+            <a:r>
+              <a:rPr lang="en-US" dirty="0"/>
+              <a:t>Course Summary</a:t>
+            </a:r>
+          </a:p>
+        </p:txBody>
+      </p:sp>
+      <p:sp>
+        <p:nvSpPr>
+          <p:cNvPr id="18" name="Rectangle 17"/>
+          <p:cNvSpPr/>
+          <p:nvPr/>
+        </p:nvSpPr>
+        <p:spPr>
+          <a:xfrm>
+            <a:off x="5597940" y="4128242"/>
+            <a:ext cx="2525494" cy="614601"/>
+          </a:xfrm>
+          <a:prstGeom prst="rect">
+            <a:avLst/>
+          </a:prstGeom>
+          <a:solidFill>
+            <a:schemeClr val="accent6">
+              <a:lumMod val="75000"/>
+            </a:schemeClr>
+          </a:solidFill>
+        </p:spPr>
+        <p:style>
+          <a:lnRef idx="2">
+            <a:schemeClr val="accent1">
+              <a:shade val="50000"/>
+            </a:schemeClr>
+          </a:lnRef>
+          <a:fillRef idx="1">
+            <a:schemeClr val="accent1"/>
+          </a:fillRef>
+          <a:effectRef idx="0">
+            <a:schemeClr val="accent1"/>
+          </a:effectRef>
+          <a:fontRef idx="minor">
+            <a:schemeClr val="lt1"/>
+          </a:fontRef>
+        </p:style>
+        <p:txBody>
+          <a:bodyPr rtlCol="0" anchor="ctr"/>
+          <a:lstStyle/>
+          <a:p>
+            <a:pPr algn="ctr"/>
+            <a:r>
+              <a:rPr lang="en-US" sz="1600" dirty="0"/>
+              <a:t>Prostate + SV</a:t>
+            </a:r>
+          </a:p>
+          <a:p>
+            <a:pPr algn="ctr"/>
+            <a:r>
+              <a:rPr lang="en-US" sz="1100" dirty="0"/>
+              <a:t>(5 fractions delivered out of 5 planned)</a:t>
+            </a:r>
+          </a:p>
+        </p:txBody>
+      </p:sp>
+      <p:sp>
+        <p:nvSpPr>
+          <p:cNvPr id="19" name="Rectangle 18"/>
+          <p:cNvSpPr/>
+          <p:nvPr/>
+        </p:nvSpPr>
+        <p:spPr>
+          <a:xfrm>
+            <a:off x="8887009" y="4128241"/>
+            <a:ext cx="2220694" cy="648001"/>
+          </a:xfrm>
+          <a:prstGeom prst="rect">
+            <a:avLst/>
+          </a:prstGeom>
+          <a:solidFill>
+            <a:srgbClr val="00B0F0"/>
+          </a:solidFill>
+        </p:spPr>
+        <p:style>
+          <a:lnRef idx="2">
+            <a:schemeClr val="accent1">
+              <a:shade val="50000"/>
+            </a:schemeClr>
+          </a:lnRef>
+          <a:fillRef idx="1">
+            <a:schemeClr val="accent1"/>
+          </a:fillRef>
+          <a:effectRef idx="0">
+            <a:schemeClr val="accent1"/>
+          </a:effectRef>
+          <a:fontRef idx="minor">
+            <a:schemeClr val="lt1"/>
+          </a:fontRef>
+        </p:style>
+        <p:txBody>
+          <a:bodyPr rtlCol="0" anchor="t" anchorCtr="0"/>
+          <a:lstStyle/>
+          <a:p>
+            <a:pPr algn="ctr"/>
+            <a:r>
+              <a:rPr lang="en-US" sz="1600" i="1" dirty="0"/>
+              <a:t>Prostate</a:t>
+            </a:r>
+          </a:p>
+          <a:p>
+            <a:pPr algn="ctr"/>
+            <a:r>
+              <a:rPr lang="en-US" sz="1100" i="1" dirty="0"/>
+              <a:t>(5 fractions delivered  of 5 planned)</a:t>
+            </a:r>
+          </a:p>
+        </p:txBody>
+      </p:sp>
+      <p:sp>
+        <p:nvSpPr>
+          <p:cNvPr id="56" name="Rectangle 55"/>
+          <p:cNvSpPr/>
+          <p:nvPr/>
+        </p:nvSpPr>
+        <p:spPr>
+          <a:xfrm>
+            <a:off x="2896239" y="1762177"/>
+            <a:ext cx="2908501" cy="1763963"/>
+          </a:xfrm>
+          <a:prstGeom prst="rect">
+            <a:avLst/>
+          </a:prstGeom>
+          <a:solidFill>
+            <a:srgbClr val="002060"/>
+          </a:solidFill>
+        </p:spPr>
+        <p:style>
+          <a:lnRef idx="2">
+            <a:schemeClr val="accent1">
+              <a:shade val="50000"/>
+            </a:schemeClr>
+          </a:lnRef>
+          <a:fillRef idx="1">
+            <a:schemeClr val="accent1"/>
+          </a:fillRef>
+          <a:effectRef idx="0">
+            <a:schemeClr val="accent1"/>
+          </a:effectRef>
+          <a:fontRef idx="minor">
+            <a:schemeClr val="lt1"/>
+          </a:fontRef>
+        </p:style>
+        <p:txBody>
+          <a:bodyPr rtlCol="0" anchor="ctr"/>
+          <a:lstStyle/>
+          <a:p>
+            <a:r>
+              <a:rPr lang="en-US" sz="1600" dirty="0"/>
+              <a:t>Phase Name: 1</a:t>
+            </a:r>
+            <a:r>
+              <a:rPr lang="en-US" sz="1600" baseline="30000" dirty="0"/>
+              <a:t>st</a:t>
+            </a:r>
+            <a:r>
+              <a:rPr lang="en-US" sz="1600" dirty="0"/>
+              <a:t> course</a:t>
+            </a:r>
+          </a:p>
+          <a:p>
+            <a:r>
+              <a:rPr lang="en-US" sz="1400" dirty="0"/>
+              <a:t>Target Volumes</a:t>
+            </a:r>
+          </a:p>
+          <a:p>
+            <a:pPr marL="461963" lvl="1" indent="-4763">
+              <a:buFont typeface="Arial" panose="020B0604020202020204" pitchFamily="34" charset="0"/>
+              <a:buChar char="•"/>
+            </a:pPr>
+            <a:r>
+              <a:rPr lang="en-US" sz="1400" dirty="0"/>
+              <a:t>    Prostate: 5000cGy</a:t>
+            </a:r>
+          </a:p>
+          <a:p>
+            <a:pPr marL="461963" lvl="1" indent="-4763">
+              <a:buFont typeface="Arial" panose="020B0604020202020204" pitchFamily="34" charset="0"/>
+              <a:buChar char="•"/>
+            </a:pPr>
+            <a:r>
+              <a:rPr lang="en-US" sz="1400" dirty="0"/>
+              <a:t>    SV: 5000 </a:t>
+            </a:r>
+            <a:r>
+              <a:rPr lang="en-US" sz="1400" dirty="0" err="1"/>
+              <a:t>cGy</a:t>
+            </a:r>
+            <a:endParaRPr lang="en-US" sz="1400" dirty="0"/>
+          </a:p>
+          <a:p>
+            <a:pPr marL="461963" lvl="1" indent="-4763">
+              <a:buFont typeface="Arial" panose="020B0604020202020204" pitchFamily="34" charset="0"/>
+              <a:buChar char="•"/>
+            </a:pPr>
+            <a:r>
+              <a:rPr lang="en-US" sz="1400" dirty="0"/>
+              <a:t>    Pelvic Nodes: 4500 </a:t>
+            </a:r>
+            <a:r>
+              <a:rPr lang="en-US" sz="1400" dirty="0" err="1"/>
+              <a:t>cGy</a:t>
+            </a:r>
+            <a:endParaRPr lang="en-US" sz="1400" dirty="0"/>
+          </a:p>
+          <a:p>
+            <a:r>
+              <a:rPr lang="en-US" sz="1400" dirty="0"/>
+              <a:t>Treated in 25 phase fractions </a:t>
+            </a:r>
+          </a:p>
+          <a:p>
+            <a:r>
+              <a:rPr lang="en-US" sz="1400" dirty="0"/>
+              <a:t>using Photons VMAT</a:t>
+            </a:r>
+          </a:p>
+        </p:txBody>
+      </p:sp>
+      <p:cxnSp>
+        <p:nvCxnSpPr>
+          <p:cNvPr id="58" name="Straight Arrow Connector 57"/>
+          <p:cNvCxnSpPr/>
+          <p:nvPr/>
+        </p:nvCxnSpPr>
+        <p:spPr>
+          <a:xfrm flipV="1">
+            <a:off x="3643745" y="3560358"/>
+            <a:ext cx="268594" cy="526852"/>
+          </a:xfrm>
+          <a:prstGeom prst="straightConnector1">
+            <a:avLst/>
+          </a:prstGeom>
+          <a:ln w="50800">
+            <a:solidFill>
+              <a:schemeClr val="tx1"/>
+            </a:solidFill>
+            <a:tailEnd type="triangle"/>
+          </a:ln>
+        </p:spPr>
+        <p:style>
+          <a:lnRef idx="1">
+            <a:schemeClr val="accent1"/>
+          </a:lnRef>
+          <a:fillRef idx="0">
+            <a:schemeClr val="accent1"/>
+          </a:fillRef>
+          <a:effectRef idx="0">
+            <a:schemeClr val="accent1"/>
+          </a:effectRef>
+          <a:fontRef idx="minor">
+            <a:schemeClr val="tx1"/>
+          </a:fontRef>
+        </p:style>
+      </p:cxnSp>
+      <p:cxnSp>
+        <p:nvCxnSpPr>
+          <p:cNvPr id="60" name="Straight Arrow Connector 59"/>
+          <p:cNvCxnSpPr>
+            <a:cxnSpLocks/>
+          </p:cNvCxnSpPr>
+          <p:nvPr/>
+        </p:nvCxnSpPr>
+        <p:spPr>
+          <a:xfrm flipV="1">
+            <a:off x="6923314" y="3610835"/>
+            <a:ext cx="184068" cy="433996"/>
+          </a:xfrm>
+          <a:prstGeom prst="straightConnector1">
+            <a:avLst/>
+          </a:prstGeom>
+          <a:ln w="50800">
+            <a:solidFill>
+              <a:schemeClr val="tx1"/>
+            </a:solidFill>
+            <a:tailEnd type="triangle"/>
+          </a:ln>
+        </p:spPr>
+        <p:style>
+          <a:lnRef idx="1">
+            <a:schemeClr val="accent1"/>
+          </a:lnRef>
+          <a:fillRef idx="0">
+            <a:schemeClr val="accent1"/>
+          </a:fillRef>
+          <a:effectRef idx="0">
+            <a:schemeClr val="accent1"/>
+          </a:effectRef>
+          <a:fontRef idx="minor">
+            <a:schemeClr val="tx1"/>
+          </a:fontRef>
+        </p:style>
+      </p:cxnSp>
+      <p:cxnSp>
+        <p:nvCxnSpPr>
+          <p:cNvPr id="63" name="Straight Arrow Connector 62"/>
+          <p:cNvCxnSpPr/>
+          <p:nvPr/>
+        </p:nvCxnSpPr>
+        <p:spPr>
+          <a:xfrm flipV="1">
+            <a:off x="9915069" y="3610835"/>
+            <a:ext cx="46901" cy="433996"/>
+          </a:xfrm>
+          <a:prstGeom prst="straightConnector1">
+            <a:avLst/>
+          </a:prstGeom>
+          <a:ln w="50800">
+            <a:solidFill>
+              <a:schemeClr val="tx1"/>
+            </a:solidFill>
+            <a:tailEnd type="triangle"/>
+          </a:ln>
+        </p:spPr>
+        <p:style>
+          <a:lnRef idx="1">
+            <a:schemeClr val="accent1"/>
+          </a:lnRef>
+          <a:fillRef idx="0">
+            <a:schemeClr val="accent1"/>
+          </a:fillRef>
+          <a:effectRef idx="0">
+            <a:schemeClr val="accent1"/>
+          </a:effectRef>
+          <a:fontRef idx="minor">
+            <a:schemeClr val="tx1"/>
+          </a:fontRef>
+        </p:style>
+      </p:cxnSp>
+      <p:sp>
+        <p:nvSpPr>
+          <p:cNvPr id="66" name="Rectangle 65"/>
+          <p:cNvSpPr/>
+          <p:nvPr/>
+        </p:nvSpPr>
+        <p:spPr>
+          <a:xfrm>
+            <a:off x="3924229" y="75577"/>
+            <a:ext cx="5344244" cy="1356491"/>
+          </a:xfrm>
+          <a:prstGeom prst="rect">
+            <a:avLst/>
+          </a:prstGeom>
+          <a:solidFill>
+            <a:schemeClr val="accent4">
+              <a:lumMod val="75000"/>
+            </a:schemeClr>
+          </a:solidFill>
+        </p:spPr>
+        <p:style>
+          <a:lnRef idx="2">
+            <a:schemeClr val="accent1">
+              <a:shade val="50000"/>
+            </a:schemeClr>
+          </a:lnRef>
+          <a:fillRef idx="1">
+            <a:schemeClr val="accent1"/>
+          </a:fillRef>
+          <a:effectRef idx="0">
+            <a:schemeClr val="accent1"/>
+          </a:effectRef>
+          <a:fontRef idx="minor">
+            <a:schemeClr val="lt1"/>
+          </a:fontRef>
+        </p:style>
+        <p:txBody>
+          <a:bodyPr rtlCol="0" anchor="ctr"/>
+          <a:lstStyle/>
+          <a:p>
+            <a:r>
+              <a:rPr lang="en-US" sz="1600" dirty="0"/>
+              <a:t>Prostate: 7000 </a:t>
+            </a:r>
+            <a:r>
+              <a:rPr lang="en-US" sz="1600" dirty="0" err="1"/>
+              <a:t>cGy</a:t>
+            </a:r>
+            <a:r>
+              <a:rPr lang="en-US" sz="1600" dirty="0"/>
+              <a:t> in 35 fractions</a:t>
+            </a:r>
+          </a:p>
+          <a:p>
+            <a:r>
+              <a:rPr lang="en-US" sz="1600" dirty="0"/>
+              <a:t>SV:  6000 </a:t>
+            </a:r>
+            <a:r>
+              <a:rPr lang="en-US" sz="1600" dirty="0" err="1"/>
+              <a:t>cGy</a:t>
+            </a:r>
+            <a:r>
+              <a:rPr lang="en-US" sz="1600" dirty="0"/>
+              <a:t> in 30 fractions</a:t>
+            </a:r>
+          </a:p>
+          <a:p>
+            <a:r>
+              <a:rPr lang="en-US" sz="1600" dirty="0"/>
+              <a:t>Pelvic Nodes: 4500 </a:t>
+            </a:r>
+            <a:r>
+              <a:rPr lang="en-US" sz="1600" dirty="0" err="1"/>
+              <a:t>cGy</a:t>
+            </a:r>
+            <a:r>
+              <a:rPr lang="en-US" sz="1600" dirty="0"/>
+              <a:t>  in 25 fractions</a:t>
+            </a:r>
+          </a:p>
+          <a:p>
+            <a:r>
+              <a:rPr lang="en-US" sz="1600" dirty="0"/>
+              <a:t>All treated in 35 sessions</a:t>
+            </a:r>
+          </a:p>
+          <a:p>
+            <a:r>
+              <a:rPr lang="en-US" sz="1600" dirty="0"/>
+              <a:t>Over 49  days</a:t>
+            </a:r>
+          </a:p>
+        </p:txBody>
+      </p:sp>
+      <p:cxnSp>
+        <p:nvCxnSpPr>
+          <p:cNvPr id="69" name="Straight Arrow Connector 68"/>
+          <p:cNvCxnSpPr>
+            <a:cxnSpLocks/>
+          </p:cNvCxnSpPr>
+          <p:nvPr/>
+        </p:nvCxnSpPr>
+        <p:spPr>
+          <a:xfrm flipV="1">
+            <a:off x="4823545" y="1495398"/>
+            <a:ext cx="177837" cy="236715"/>
+          </a:xfrm>
+          <a:prstGeom prst="straightConnector1">
+            <a:avLst/>
+          </a:prstGeom>
+          <a:ln w="50800">
+            <a:solidFill>
+              <a:schemeClr val="tx1"/>
+            </a:solidFill>
+            <a:tailEnd type="triangle"/>
+          </a:ln>
+        </p:spPr>
+        <p:style>
+          <a:lnRef idx="1">
+            <a:schemeClr val="accent1"/>
+          </a:lnRef>
+          <a:fillRef idx="0">
+            <a:schemeClr val="accent1"/>
+          </a:fillRef>
+          <a:effectRef idx="0">
+            <a:schemeClr val="accent1"/>
+          </a:effectRef>
+          <a:fontRef idx="minor">
+            <a:schemeClr val="tx1"/>
+          </a:fontRef>
+        </p:style>
+      </p:cxnSp>
+      <p:sp>
+        <p:nvSpPr>
+          <p:cNvPr id="23" name="Rectangle 22"/>
+          <p:cNvSpPr/>
+          <p:nvPr/>
+        </p:nvSpPr>
+        <p:spPr>
+          <a:xfrm>
+            <a:off x="6334469" y="1762177"/>
+            <a:ext cx="2296913" cy="1798181"/>
+          </a:xfrm>
+          <a:prstGeom prst="rect">
+            <a:avLst/>
+          </a:prstGeom>
+          <a:solidFill>
+            <a:srgbClr val="002060"/>
+          </a:solidFill>
+        </p:spPr>
+        <p:style>
+          <a:lnRef idx="2">
+            <a:schemeClr val="accent1">
+              <a:shade val="50000"/>
+            </a:schemeClr>
+          </a:lnRef>
+          <a:fillRef idx="1">
+            <a:schemeClr val="accent1"/>
+          </a:fillRef>
+          <a:effectRef idx="0">
+            <a:schemeClr val="accent1"/>
+          </a:effectRef>
+          <a:fontRef idx="minor">
+            <a:schemeClr val="lt1"/>
+          </a:fontRef>
+        </p:style>
+        <p:txBody>
+          <a:bodyPr rtlCol="0" anchor="t" anchorCtr="0"/>
+          <a:lstStyle/>
+          <a:p>
+            <a:r>
+              <a:rPr lang="en-US" sz="1600" dirty="0"/>
+              <a:t>Phase Name: Boost 1</a:t>
+            </a:r>
+          </a:p>
+          <a:p>
+            <a:r>
+              <a:rPr lang="en-US" sz="1400" dirty="0"/>
+              <a:t>Target Volumes</a:t>
+            </a:r>
+          </a:p>
+          <a:p>
+            <a:pPr lvl="1">
+              <a:buFont typeface="Arial" panose="020B0604020202020204" pitchFamily="34" charset="0"/>
+              <a:buChar char="•"/>
+            </a:pPr>
+            <a:r>
+              <a:rPr lang="en-US" sz="1400" dirty="0"/>
+              <a:t>    Prostate: 1000 </a:t>
+            </a:r>
+            <a:r>
+              <a:rPr lang="en-US" sz="1400" dirty="0" err="1"/>
+              <a:t>cGy</a:t>
+            </a:r>
+            <a:endParaRPr lang="en-US" sz="1400" dirty="0"/>
+          </a:p>
+          <a:p>
+            <a:pPr lvl="1">
+              <a:buFont typeface="Arial" panose="020B0604020202020204" pitchFamily="34" charset="0"/>
+              <a:buChar char="•"/>
+            </a:pPr>
+            <a:r>
+              <a:rPr lang="en-US" sz="1400" dirty="0"/>
+              <a:t>    SV: 1000 </a:t>
+            </a:r>
+            <a:r>
+              <a:rPr lang="en-US" sz="1400" dirty="0" err="1"/>
+              <a:t>cGy</a:t>
+            </a:r>
+            <a:endParaRPr lang="en-US" sz="1400" dirty="0"/>
+          </a:p>
+          <a:p>
+            <a:r>
+              <a:rPr lang="en-US" sz="1400" dirty="0"/>
+              <a:t>Treated in 5  phase fractions </a:t>
+            </a:r>
+          </a:p>
+          <a:p>
+            <a:r>
+              <a:rPr lang="en-US" sz="1400" dirty="0"/>
+              <a:t>using Photons VMAT</a:t>
+            </a:r>
+          </a:p>
+        </p:txBody>
+      </p:sp>
+      <p:sp>
+        <p:nvSpPr>
+          <p:cNvPr id="24" name="Rectangle 23"/>
+          <p:cNvSpPr/>
+          <p:nvPr/>
+        </p:nvSpPr>
+        <p:spPr>
+          <a:xfrm>
+            <a:off x="8995362" y="1762177"/>
+            <a:ext cx="2583680" cy="1798181"/>
+          </a:xfrm>
+          <a:prstGeom prst="rect">
+            <a:avLst/>
+          </a:prstGeom>
+          <a:solidFill>
+            <a:srgbClr val="002060"/>
+          </a:solidFill>
+        </p:spPr>
+        <p:style>
+          <a:lnRef idx="2">
+            <a:schemeClr val="accent1">
+              <a:shade val="50000"/>
+            </a:schemeClr>
+          </a:lnRef>
+          <a:fillRef idx="1">
+            <a:schemeClr val="accent1"/>
+          </a:fillRef>
+          <a:effectRef idx="0">
+            <a:schemeClr val="accent1"/>
+          </a:effectRef>
+          <a:fontRef idx="minor">
+            <a:schemeClr val="lt1"/>
+          </a:fontRef>
+        </p:style>
+        <p:txBody>
+          <a:bodyPr rtlCol="0" anchor="t" anchorCtr="0"/>
+          <a:lstStyle/>
+          <a:p>
+            <a:r>
+              <a:rPr lang="en-US" sz="1600" dirty="0"/>
+              <a:t>Rx Phase Name: Boost 2</a:t>
+            </a:r>
+          </a:p>
+          <a:p>
+            <a:r>
+              <a:rPr lang="en-US" sz="1400" dirty="0"/>
+              <a:t>Target Volumes</a:t>
+            </a:r>
+          </a:p>
+          <a:p>
+            <a:pPr lvl="1">
+              <a:buFont typeface="Arial" panose="020B0604020202020204" pitchFamily="34" charset="0"/>
+              <a:buChar char="•"/>
+            </a:pPr>
+            <a:r>
+              <a:rPr lang="en-US" sz="1400" dirty="0"/>
+              <a:t>    Prostate: 1000</a:t>
+            </a:r>
+          </a:p>
+          <a:p>
+            <a:r>
+              <a:rPr lang="en-US" sz="1400" dirty="0"/>
+              <a:t>Treated in 5 phase  fractions</a:t>
+            </a:r>
+          </a:p>
+          <a:p>
+            <a:r>
+              <a:rPr lang="en-US" sz="1400" dirty="0"/>
+              <a:t>using Photons VMAT</a:t>
+            </a:r>
+          </a:p>
+        </p:txBody>
+      </p:sp>
+      <p:cxnSp>
+        <p:nvCxnSpPr>
+          <p:cNvPr id="36" name="Straight Arrow Connector 35"/>
+          <p:cNvCxnSpPr>
+            <a:cxnSpLocks/>
+          </p:cNvCxnSpPr>
+          <p:nvPr/>
+        </p:nvCxnSpPr>
+        <p:spPr>
+          <a:xfrm flipV="1">
+            <a:off x="7406670" y="1433683"/>
+            <a:ext cx="0" cy="298430"/>
+          </a:xfrm>
+          <a:prstGeom prst="straightConnector1">
+            <a:avLst/>
+          </a:prstGeom>
+          <a:ln w="50800">
+            <a:solidFill>
+              <a:schemeClr val="tx1"/>
+            </a:solidFill>
+            <a:tailEnd type="triangle"/>
+          </a:ln>
+        </p:spPr>
+        <p:style>
+          <a:lnRef idx="1">
+            <a:schemeClr val="accent1"/>
+          </a:lnRef>
+          <a:fillRef idx="0">
+            <a:schemeClr val="accent1"/>
+          </a:fillRef>
+          <a:effectRef idx="0">
+            <a:schemeClr val="accent1"/>
+          </a:effectRef>
+          <a:fontRef idx="minor">
+            <a:schemeClr val="tx1"/>
+          </a:fontRef>
+        </p:style>
+      </p:cxnSp>
+      <p:cxnSp>
+        <p:nvCxnSpPr>
+          <p:cNvPr id="38" name="Straight Arrow Connector 37"/>
+          <p:cNvCxnSpPr/>
+          <p:nvPr/>
+        </p:nvCxnSpPr>
+        <p:spPr>
+          <a:xfrm flipH="1" flipV="1">
+            <a:off x="9198982" y="1475463"/>
+            <a:ext cx="138982" cy="270210"/>
+          </a:xfrm>
+          <a:prstGeom prst="straightConnector1">
+            <a:avLst/>
+          </a:prstGeom>
+          <a:ln w="50800">
+            <a:solidFill>
+              <a:schemeClr val="tx1"/>
+            </a:solidFill>
+            <a:tailEnd type="triangle"/>
+          </a:ln>
+        </p:spPr>
+        <p:style>
+          <a:lnRef idx="1">
+            <a:schemeClr val="accent1"/>
+          </a:lnRef>
+          <a:fillRef idx="0">
+            <a:schemeClr val="accent1"/>
+          </a:fillRef>
+          <a:effectRef idx="0">
+            <a:schemeClr val="accent1"/>
+          </a:effectRef>
+          <a:fontRef idx="minor">
+            <a:schemeClr val="tx1"/>
+          </a:fontRef>
+        </p:style>
+      </p:cxnSp>
+      <p:sp>
+        <p:nvSpPr>
+          <p:cNvPr id="26" name="Rectangle 25">
+            <a:extLst>
+              <a:ext uri="{FF2B5EF4-FFF2-40B4-BE49-F238E27FC236}">
+                <a16:creationId xmlns:a16="http://schemas.microsoft.com/office/drawing/2014/main" id="{A4602A46-24FF-4997-9693-7872F0AA456D}"/>
+              </a:ext>
+            </a:extLst>
+          </p:cNvPr>
+          <p:cNvSpPr/>
+          <p:nvPr/>
+        </p:nvSpPr>
+        <p:spPr>
+          <a:xfrm>
+            <a:off x="2533397" y="4118939"/>
+            <a:ext cx="2220695" cy="614601"/>
+          </a:xfrm>
+          <a:prstGeom prst="rect">
+            <a:avLst/>
+          </a:prstGeom>
+          <a:solidFill>
+            <a:schemeClr val="accent2">
+              <a:lumMod val="75000"/>
+            </a:schemeClr>
+          </a:solidFill>
+        </p:spPr>
+        <p:style>
+          <a:lnRef idx="2">
+            <a:schemeClr val="accent1">
+              <a:shade val="50000"/>
+            </a:schemeClr>
+          </a:lnRef>
+          <a:fillRef idx="1">
+            <a:schemeClr val="accent1"/>
+          </a:fillRef>
+          <a:effectRef idx="0">
+            <a:schemeClr val="accent1"/>
+          </a:effectRef>
+          <a:fontRef idx="minor">
+            <a:schemeClr val="lt1"/>
+          </a:fontRef>
+        </p:style>
+        <p:txBody>
+          <a:bodyPr rtlCol="0" anchor="ctr"/>
+          <a:lstStyle/>
+          <a:p>
+            <a:pPr algn="ctr"/>
+            <a:r>
+              <a:rPr lang="en-US" sz="1600" dirty="0"/>
+              <a:t>Pelvis</a:t>
+            </a:r>
+          </a:p>
+          <a:p>
+            <a:pPr algn="ctr"/>
+            <a:r>
+              <a:rPr lang="en-US" sz="1100" i="1" dirty="0"/>
+              <a:t>(25 delivered of 25 planned)</a:t>
+            </a:r>
+          </a:p>
+        </p:txBody>
+      </p:sp>
+      <p:sp>
+        <p:nvSpPr>
+          <p:cNvPr id="13" name="TextBox 12">
+            <a:extLst>
+              <a:ext uri="{FF2B5EF4-FFF2-40B4-BE49-F238E27FC236}">
+                <a16:creationId xmlns:a16="http://schemas.microsoft.com/office/drawing/2014/main" id="{F6147ABC-FFCB-4AC1-BA12-57964C6A57FA}"/>
+              </a:ext>
+            </a:extLst>
+          </p:cNvPr>
+          <p:cNvSpPr txBox="1"/>
+          <p:nvPr/>
+        </p:nvSpPr>
+        <p:spPr>
+          <a:xfrm>
+            <a:off x="9915069" y="437745"/>
+            <a:ext cx="1014124" cy="369332"/>
+          </a:xfrm>
+          <a:prstGeom prst="rect">
+            <a:avLst/>
+          </a:prstGeom>
+          <a:noFill/>
+        </p:spPr>
+        <p:txBody>
+          <a:bodyPr wrap="none" rtlCol="0">
+            <a:spAutoFit/>
+          </a:bodyPr>
+          <a:lstStyle/>
+          <a:p>
+            <a:r>
+              <a:rPr lang="en-US" dirty="0"/>
+              <a:t>Prostate </a:t>
+            </a:r>
+          </a:p>
+        </p:txBody>
+      </p:sp>
+      <p:pic>
+        <p:nvPicPr>
+          <p:cNvPr id="14" name="Picture 13">
+            <a:extLst>
+              <a:ext uri="{FF2B5EF4-FFF2-40B4-BE49-F238E27FC236}">
+                <a16:creationId xmlns:a16="http://schemas.microsoft.com/office/drawing/2014/main" id="{4813169A-28BD-4647-938D-7E528CD3EFE9}"/>
+              </a:ext>
+            </a:extLst>
+          </p:cNvPr>
+          <p:cNvPicPr>
+            <a:picLocks noChangeAspect="1"/>
+          </p:cNvPicPr>
+          <p:nvPr/>
+        </p:nvPicPr>
+        <p:blipFill>
+          <a:blip r:embed="rId2"/>
+          <a:stretch>
+            <a:fillRect/>
+          </a:stretch>
+        </p:blipFill>
+        <p:spPr>
+          <a:xfrm>
+            <a:off x="1192634" y="5034811"/>
+            <a:ext cx="9915069" cy="1680660"/>
+          </a:xfrm>
+          <a:prstGeom prst="rect">
+            <a:avLst/>
+          </a:prstGeom>
+        </p:spPr>
+      </p:pic>
+    </p:spTree>
+    <p:extLst>
+      <p:ext uri="{BB962C8B-B14F-4D97-AF65-F5344CB8AC3E}">
+        <p14:creationId xmlns:p14="http://schemas.microsoft.com/office/powerpoint/2010/main" val="1281428247"/>
       </p:ext>
     </p:extLst>
   </p:cSld>

</xml_diff>